<commit_message>
added testing files and demo
</commit_message>
<xml_diff>
--- a/FYP_Demo.pptx
+++ b/FYP_Demo.pptx
@@ -9,27 +9,27 @@
   </p:notesMasterIdLst>
   <p:sldIdLst>
     <p:sldId id="256" r:id="rId2"/>
-    <p:sldId id="257" r:id="rId3"/>
-    <p:sldId id="270" r:id="rId4"/>
-    <p:sldId id="264" r:id="rId5"/>
-    <p:sldId id="269" r:id="rId6"/>
-    <p:sldId id="271" r:id="rId7"/>
-    <p:sldId id="263" r:id="rId8"/>
-    <p:sldId id="272" r:id="rId9"/>
-    <p:sldId id="273" r:id="rId10"/>
-    <p:sldId id="274" r:id="rId11"/>
-    <p:sldId id="275" r:id="rId12"/>
-    <p:sldId id="276" r:id="rId13"/>
-    <p:sldId id="277" r:id="rId14"/>
-    <p:sldId id="266" r:id="rId15"/>
-    <p:sldId id="265" r:id="rId16"/>
-    <p:sldId id="268" r:id="rId17"/>
-    <p:sldId id="267" r:id="rId18"/>
-    <p:sldId id="260" r:id="rId19"/>
-    <p:sldId id="262" r:id="rId20"/>
-    <p:sldId id="258" r:id="rId21"/>
-    <p:sldId id="259" r:id="rId22"/>
-    <p:sldId id="261" r:id="rId23"/>
+    <p:sldId id="270" r:id="rId3"/>
+    <p:sldId id="264" r:id="rId4"/>
+    <p:sldId id="269" r:id="rId5"/>
+    <p:sldId id="271" r:id="rId6"/>
+    <p:sldId id="263" r:id="rId7"/>
+    <p:sldId id="272" r:id="rId8"/>
+    <p:sldId id="273" r:id="rId9"/>
+    <p:sldId id="274" r:id="rId10"/>
+    <p:sldId id="275" r:id="rId11"/>
+    <p:sldId id="276" r:id="rId12"/>
+    <p:sldId id="277" r:id="rId13"/>
+    <p:sldId id="266" r:id="rId14"/>
+    <p:sldId id="265" r:id="rId15"/>
+    <p:sldId id="279" r:id="rId16"/>
+    <p:sldId id="280" r:id="rId17"/>
+    <p:sldId id="281" r:id="rId18"/>
+    <p:sldId id="282" r:id="rId19"/>
+    <p:sldId id="278" r:id="rId20"/>
+    <p:sldId id="267" r:id="rId21"/>
+    <p:sldId id="262" r:id="rId22"/>
+    <p:sldId id="283" r:id="rId23"/>
   </p:sldIdLst>
   <p:sldSz cx="9144000" cy="6858000" type="screen4x3"/>
   <p:notesSz cx="6858000" cy="9947275"/>
@@ -506,91 +506,6 @@
     <p:extLst>
       <p:ext uri="{BB962C8B-B14F-4D97-AF65-F5344CB8AC3E}">
         <p14:creationId xmlns:p14="http://schemas.microsoft.com/office/powerpoint/2010/main" val="3015334506"/>
-      </p:ext>
-    </p:extLst>
-  </p:cSld>
-  <p:clrMapOvr>
-    <a:masterClrMapping/>
-  </p:clrMapOvr>
-</p:notes>
-</file>
-
-<file path=ppt/notesSlides/notesSlide2.xml><?xml version="1.0" encoding="utf-8"?>
-<p:notes xmlns:a="http://schemas.openxmlformats.org/drawingml/2006/main" xmlns:r="http://schemas.openxmlformats.org/officeDocument/2006/relationships" xmlns:p="http://schemas.openxmlformats.org/presentationml/2006/main">
-  <p:cSld>
-    <p:spTree>
-      <p:nvGrpSpPr>
-        <p:cNvPr id="1" name=""/>
-        <p:cNvGrpSpPr/>
-        <p:nvPr/>
-      </p:nvGrpSpPr>
-      <p:grpSpPr>
-        <a:xfrm>
-          <a:off x="0" y="0"/>
-          <a:ext cx="0" cy="0"/>
-          <a:chOff x="0" y="0"/>
-          <a:chExt cx="0" cy="0"/>
-        </a:xfrm>
-      </p:grpSpPr>
-      <p:sp>
-        <p:nvSpPr>
-          <p:cNvPr id="2" name="Slide Image Placeholder 1"/>
-          <p:cNvSpPr>
-            <a:spLocks noGrp="1" noRot="1" noChangeAspect="1"/>
-          </p:cNvSpPr>
-          <p:nvPr>
-            <p:ph type="sldImg"/>
-          </p:nvPr>
-        </p:nvSpPr>
-        <p:spPr/>
-      </p:sp>
-      <p:sp>
-        <p:nvSpPr>
-          <p:cNvPr id="3" name="Notes Placeholder 2"/>
-          <p:cNvSpPr>
-            <a:spLocks noGrp="1"/>
-          </p:cNvSpPr>
-          <p:nvPr>
-            <p:ph type="body" idx="1"/>
-          </p:nvPr>
-        </p:nvSpPr>
-        <p:spPr/>
-        <p:txBody>
-          <a:bodyPr/>
-          <a:lstStyle/>
-          <a:p>
-            <a:endParaRPr lang="en-IE"/>
-          </a:p>
-        </p:txBody>
-      </p:sp>
-      <p:sp>
-        <p:nvSpPr>
-          <p:cNvPr id="4" name="Slide Number Placeholder 3"/>
-          <p:cNvSpPr>
-            <a:spLocks noGrp="1"/>
-          </p:cNvSpPr>
-          <p:nvPr>
-            <p:ph type="sldNum" sz="quarter" idx="10"/>
-          </p:nvPr>
-        </p:nvSpPr>
-        <p:spPr/>
-        <p:txBody>
-          <a:bodyPr/>
-          <a:lstStyle/>
-          <a:p>
-            <a:fld id="{49DD4D23-C98A-435E-AE88-9061F8349B02}" type="slidenum">
-              <a:rPr lang="en-GB" smtClean="0"/>
-              <a:pPr/>
-              <a:t>22</a:t>
-            </a:fld>
-            <a:endParaRPr lang="en-GB"/>
-          </a:p>
-        </p:txBody>
-      </p:sp>
-    </p:spTree>
-    <p:extLst>
-      <p:ext uri="{BB962C8B-B14F-4D97-AF65-F5344CB8AC3E}">
-        <p14:creationId xmlns:p14="http://schemas.microsoft.com/office/powerpoint/2010/main" val="1324602234"/>
       </p:ext>
     </p:extLst>
   </p:cSld>
@@ -3156,7 +3071,7 @@
             <a:pPr lvl="2"/>
             <a:r>
               <a:rPr lang="en-GB" sz="1800" dirty="0"/>
-              <a:t>3/4/10</a:t>
+              <a:t>3/4/19</a:t>
             </a:r>
           </a:p>
         </p:txBody>
@@ -3196,7 +3111,7 @@
           <p:cNvPr id="2" name="Title 1">
             <a:extLst>
               <a:ext uri="{FF2B5EF4-FFF2-40B4-BE49-F238E27FC236}">
-                <a16:creationId xmlns:a16="http://schemas.microsoft.com/office/drawing/2014/main" id="{45745A0E-2170-42CD-B425-FB95F81C3E9E}"/>
+                <a16:creationId xmlns:a16="http://schemas.microsoft.com/office/drawing/2014/main" id="{8CF3F5B6-318C-49E9-AF6D-5A0473F54783}"/>
               </a:ext>
             </a:extLst>
           </p:cNvPr>
@@ -3224,7 +3139,7 @@
           <p:cNvPr id="3" name="Text Placeholder 2">
             <a:extLst>
               <a:ext uri="{FF2B5EF4-FFF2-40B4-BE49-F238E27FC236}">
-                <a16:creationId xmlns:a16="http://schemas.microsoft.com/office/drawing/2014/main" id="{B101F8C3-F40F-4536-9CBE-CC5C33996B28}"/>
+                <a16:creationId xmlns:a16="http://schemas.microsoft.com/office/drawing/2014/main" id="{A66FD13B-846D-478D-8ACE-7D81C26AC289}"/>
               </a:ext>
             </a:extLst>
           </p:cNvPr>
@@ -3245,7 +3160,7 @@
             </a:pPr>
             <a:r>
               <a:rPr lang="en-IE" b="1" u="sng" dirty="0"/>
-              <a:t>5. Transparency</a:t>
+              <a:t>7. Storage</a:t>
             </a:r>
             <a:endParaRPr lang="en-IE" dirty="0"/>
           </a:p>
@@ -3255,15 +3170,7 @@
             </a:pPr>
             <a:r>
               <a:rPr lang="en-IE" dirty="0"/>
-              <a:t>Is there transparency in the processing and use of the data? </a:t>
-            </a:r>
-            <a:r>
-              <a:rPr lang="en-IE" dirty="0" err="1"/>
-              <a:t>i.e</a:t>
-            </a:r>
-            <a:r>
-              <a:rPr lang="en-IE" dirty="0"/>
-              <a:t>: Info notices, paper trails etc</a:t>
+              <a:t>Is there a storage time limitation? What technical measures have been taken to protect personal data from un-authorised access? What level of security is needed?</a:t>
             </a:r>
           </a:p>
           <a:p>
@@ -3272,7 +3179,7 @@
             </a:pPr>
             <a:r>
               <a:rPr lang="en-IE" b="1" u="sng" dirty="0"/>
-              <a:t>6. Data Rights</a:t>
+              <a:t>8. Data Governance</a:t>
             </a:r>
             <a:endParaRPr lang="en-IE" dirty="0"/>
           </a:p>
@@ -3282,15 +3189,15 @@
             </a:pPr>
             <a:r>
               <a:rPr lang="en-IE" dirty="0"/>
-              <a:t>Can data subjects access their data on request? Can the data be erased? Can data subjects object to certain types of use of the data </a:t>
+              <a:t>What measures have been implemented/completed to reduce the risk/impact of a breach? </a:t>
             </a:r>
             <a:r>
               <a:rPr lang="en-IE" dirty="0" err="1"/>
-              <a:t>eg</a:t>
+              <a:t>Eg</a:t>
             </a:r>
             <a:r>
               <a:rPr lang="en-IE" dirty="0"/>
-              <a:t>: direct marketing? Will data subjects be notified on a data breach?</a:t>
+              <a:t>: Data Protection Impact Assessment (DPIA), audits, policy reviews, data protection officer, privacy canvas, certifications.</a:t>
             </a:r>
           </a:p>
           <a:p>
@@ -3299,12 +3206,6 @@
             </a:pPr>
             <a:endParaRPr lang="en-IE" dirty="0"/>
           </a:p>
-          <a:p>
-            <a:pPr marL="0" indent="0">
-              <a:buNone/>
-            </a:pPr>
-            <a:endParaRPr lang="en-IE" dirty="0"/>
-          </a:p>
         </p:txBody>
       </p:sp>
       <p:sp>
@@ -3312,7 +3213,7 @@
           <p:cNvPr id="4" name="Text Placeholder 3">
             <a:extLst>
               <a:ext uri="{FF2B5EF4-FFF2-40B4-BE49-F238E27FC236}">
-                <a16:creationId xmlns:a16="http://schemas.microsoft.com/office/drawing/2014/main" id="{51619E2E-036B-445B-880E-C5CA37367A42}"/>
+                <a16:creationId xmlns:a16="http://schemas.microsoft.com/office/drawing/2014/main" id="{9E4B1055-5548-4F78-9E64-F309058756F6}"/>
               </a:ext>
             </a:extLst>
           </p:cNvPr>
@@ -3340,7 +3241,7 @@
           <p:cNvPr id="5" name="Slide Number Placeholder 4">
             <a:extLst>
               <a:ext uri="{FF2B5EF4-FFF2-40B4-BE49-F238E27FC236}">
-                <a16:creationId xmlns:a16="http://schemas.microsoft.com/office/drawing/2014/main" id="{05AE0FCE-B964-42DF-A91D-5EFFC00168CD}"/>
+                <a16:creationId xmlns:a16="http://schemas.microsoft.com/office/drawing/2014/main" id="{E52F7630-1657-4EB7-A0AE-4EDB20459B6D}"/>
               </a:ext>
             </a:extLst>
           </p:cNvPr>
@@ -3367,7 +3268,7 @@
     </p:spTree>
     <p:extLst>
       <p:ext uri="{BB962C8B-B14F-4D97-AF65-F5344CB8AC3E}">
-        <p14:creationId xmlns:p14="http://schemas.microsoft.com/office/powerpoint/2010/main" val="1420828051"/>
+        <p14:creationId xmlns:p14="http://schemas.microsoft.com/office/powerpoint/2010/main" val="2318300520"/>
       </p:ext>
     </p:extLst>
   </p:cSld>
@@ -3399,7 +3300,7 @@
           <p:cNvPr id="2" name="Title 1">
             <a:extLst>
               <a:ext uri="{FF2B5EF4-FFF2-40B4-BE49-F238E27FC236}">
-                <a16:creationId xmlns:a16="http://schemas.microsoft.com/office/drawing/2014/main" id="{8CF3F5B6-318C-49E9-AF6D-5A0473F54783}"/>
+                <a16:creationId xmlns:a16="http://schemas.microsoft.com/office/drawing/2014/main" id="{302432BD-1927-4CC4-A1CD-9FB2C11D3300}"/>
               </a:ext>
             </a:extLst>
           </p:cNvPr>
@@ -3427,7 +3328,7 @@
           <p:cNvPr id="3" name="Text Placeholder 2">
             <a:extLst>
               <a:ext uri="{FF2B5EF4-FFF2-40B4-BE49-F238E27FC236}">
-                <a16:creationId xmlns:a16="http://schemas.microsoft.com/office/drawing/2014/main" id="{A66FD13B-846D-478D-8ACE-7D81C26AC289}"/>
+                <a16:creationId xmlns:a16="http://schemas.microsoft.com/office/drawing/2014/main" id="{362826ED-A6A9-4A29-A28B-3B5EAC7CD453}"/>
               </a:ext>
             </a:extLst>
           </p:cNvPr>
@@ -3448,7 +3349,7 @@
             </a:pPr>
             <a:r>
               <a:rPr lang="en-IE" b="1" u="sng" dirty="0"/>
-              <a:t>7. Storage</a:t>
+              <a:t>9. Breach</a:t>
             </a:r>
             <a:endParaRPr lang="en-IE" dirty="0"/>
           </a:p>
@@ -3458,41 +3359,8 @@
             </a:pPr>
             <a:r>
               <a:rPr lang="en-IE" dirty="0"/>
-              <a:t>Is there a storage time limitation? What technical measures have been taken to protect personal data from un-authorised access? What level of security is needed?</a:t>
-            </a:r>
-          </a:p>
-          <a:p>
-            <a:pPr marL="0" indent="0">
-              <a:buNone/>
-            </a:pPr>
-            <a:r>
-              <a:rPr lang="en-IE" b="1" u="sng" dirty="0"/>
-              <a:t>8. Data Governance</a:t>
-            </a:r>
-            <a:endParaRPr lang="en-IE" dirty="0"/>
-          </a:p>
-          <a:p>
-            <a:pPr marL="0" indent="0">
-              <a:buNone/>
-            </a:pPr>
-            <a:r>
-              <a:rPr lang="en-IE" dirty="0"/>
-              <a:t>What measures have been implemented/completed to reduce the risk/impact of a breach? </a:t>
-            </a:r>
-            <a:r>
-              <a:rPr lang="en-IE" dirty="0" err="1"/>
-              <a:t>Eg</a:t>
-            </a:r>
-            <a:r>
-              <a:rPr lang="en-IE" dirty="0"/>
-              <a:t>: Data Protection Impact Assessment (DPIA), audits, policy reviews, data protection officer, privacy canvas, certifications.</a:t>
-            </a:r>
-          </a:p>
-          <a:p>
-            <a:pPr marL="0" indent="0">
-              <a:buNone/>
-            </a:pPr>
-            <a:endParaRPr lang="en-IE" dirty="0"/>
+              <a:t>What happens after a data breach? Who is notified? Do you maintain an internal breach register? Possibility of administration fines.</a:t>
+            </a:r>
           </a:p>
         </p:txBody>
       </p:sp>
@@ -3501,7 +3369,7 @@
           <p:cNvPr id="4" name="Text Placeholder 3">
             <a:extLst>
               <a:ext uri="{FF2B5EF4-FFF2-40B4-BE49-F238E27FC236}">
-                <a16:creationId xmlns:a16="http://schemas.microsoft.com/office/drawing/2014/main" id="{9E4B1055-5548-4F78-9E64-F309058756F6}"/>
+                <a16:creationId xmlns:a16="http://schemas.microsoft.com/office/drawing/2014/main" id="{B53C1957-BD45-4A1B-841B-B4EAB59EC936}"/>
               </a:ext>
             </a:extLst>
           </p:cNvPr>
@@ -3529,7 +3397,7 @@
           <p:cNvPr id="5" name="Slide Number Placeholder 4">
             <a:extLst>
               <a:ext uri="{FF2B5EF4-FFF2-40B4-BE49-F238E27FC236}">
-                <a16:creationId xmlns:a16="http://schemas.microsoft.com/office/drawing/2014/main" id="{E52F7630-1657-4EB7-A0AE-4EDB20459B6D}"/>
+                <a16:creationId xmlns:a16="http://schemas.microsoft.com/office/drawing/2014/main" id="{DB452C4F-CF90-4AA3-93DD-DB12D0270440}"/>
               </a:ext>
             </a:extLst>
           </p:cNvPr>
@@ -3556,7 +3424,7 @@
     </p:spTree>
     <p:extLst>
       <p:ext uri="{BB962C8B-B14F-4D97-AF65-F5344CB8AC3E}">
-        <p14:creationId xmlns:p14="http://schemas.microsoft.com/office/powerpoint/2010/main" val="2318300520"/>
+        <p14:creationId xmlns:p14="http://schemas.microsoft.com/office/powerpoint/2010/main" val="3424614265"/>
       </p:ext>
     </p:extLst>
   </p:cSld>
@@ -3588,7 +3456,7 @@
           <p:cNvPr id="2" name="Title 1">
             <a:extLst>
               <a:ext uri="{FF2B5EF4-FFF2-40B4-BE49-F238E27FC236}">
-                <a16:creationId xmlns:a16="http://schemas.microsoft.com/office/drawing/2014/main" id="{302432BD-1927-4CC4-A1CD-9FB2C11D3300}"/>
+                <a16:creationId xmlns:a16="http://schemas.microsoft.com/office/drawing/2014/main" id="{952E551F-38F8-411E-AE55-9911DE0E08A1}"/>
               </a:ext>
             </a:extLst>
           </p:cNvPr>
@@ -3616,7 +3484,7 @@
           <p:cNvPr id="3" name="Text Placeholder 2">
             <a:extLst>
               <a:ext uri="{FF2B5EF4-FFF2-40B4-BE49-F238E27FC236}">
-                <a16:creationId xmlns:a16="http://schemas.microsoft.com/office/drawing/2014/main" id="{362826ED-A6A9-4A29-A28B-3B5EAC7CD453}"/>
+                <a16:creationId xmlns:a16="http://schemas.microsoft.com/office/drawing/2014/main" id="{3436419F-E688-472B-9E13-72E3A4382023}"/>
               </a:ext>
             </a:extLst>
           </p:cNvPr>
@@ -3632,22 +3500,45 @@
           <a:bodyPr/>
           <a:lstStyle/>
           <a:p>
-            <a:pPr marL="0" indent="0">
-              <a:buNone/>
-            </a:pPr>
-            <a:r>
-              <a:rPr lang="en-IE" b="1" u="sng" dirty="0"/>
-              <a:t>9. Breach</a:t>
-            </a:r>
-            <a:endParaRPr lang="en-IE" dirty="0"/>
-          </a:p>
-          <a:p>
-            <a:pPr marL="0" indent="0">
-              <a:buNone/>
-            </a:pPr>
             <a:r>
               <a:rPr lang="en-IE" dirty="0"/>
-              <a:t>What happens after a data breach? Who is notified? Do you maintain an internal breach register? Possibility of administration fines.</a:t>
+              <a:t>Refactored Ethics Canvas Code</a:t>
+            </a:r>
+          </a:p>
+          <a:p>
+            <a:r>
+              <a:rPr lang="en-IE" dirty="0"/>
+              <a:t>Allow Virtual Privacy Canvas (proof of concept)</a:t>
+            </a:r>
+          </a:p>
+          <a:p>
+            <a:r>
+              <a:rPr lang="en-IE" dirty="0"/>
+              <a:t>Debian on a Virtual Machine</a:t>
+            </a:r>
+          </a:p>
+          <a:p>
+            <a:r>
+              <a:rPr lang="en-IE" dirty="0"/>
+              <a:t>Django Web Framework</a:t>
+            </a:r>
+          </a:p>
+          <a:p>
+            <a:r>
+              <a:rPr lang="en-IE" dirty="0"/>
+              <a:t>JavaScript, HTML, CSS Frontend</a:t>
+            </a:r>
+          </a:p>
+          <a:p>
+            <a:r>
+              <a:rPr lang="en-IE" dirty="0"/>
+              <a:t>Django(Python), PHP Backend</a:t>
+            </a:r>
+          </a:p>
+          <a:p>
+            <a:r>
+              <a:rPr lang="en-IE" dirty="0"/>
+              <a:t>Tags</a:t>
             </a:r>
           </a:p>
         </p:txBody>
@@ -3657,7 +3548,7 @@
           <p:cNvPr id="4" name="Text Placeholder 3">
             <a:extLst>
               <a:ext uri="{FF2B5EF4-FFF2-40B4-BE49-F238E27FC236}">
-                <a16:creationId xmlns:a16="http://schemas.microsoft.com/office/drawing/2014/main" id="{B53C1957-BD45-4A1B-841B-B4EAB59EC936}"/>
+                <a16:creationId xmlns:a16="http://schemas.microsoft.com/office/drawing/2014/main" id="{9D316178-E05E-4D9B-8E41-3B973B5AF721}"/>
               </a:ext>
             </a:extLst>
           </p:cNvPr>
@@ -3675,7 +3566,7 @@
           <a:p>
             <a:r>
               <a:rPr lang="en-IE" dirty="0"/>
-              <a:t>My Privacy Canvas</a:t>
+              <a:t>Technical Implementation</a:t>
             </a:r>
           </a:p>
         </p:txBody>
@@ -3685,7 +3576,7 @@
           <p:cNvPr id="5" name="Slide Number Placeholder 4">
             <a:extLst>
               <a:ext uri="{FF2B5EF4-FFF2-40B4-BE49-F238E27FC236}">
-                <a16:creationId xmlns:a16="http://schemas.microsoft.com/office/drawing/2014/main" id="{DB452C4F-CF90-4AA3-93DD-DB12D0270440}"/>
+                <a16:creationId xmlns:a16="http://schemas.microsoft.com/office/drawing/2014/main" id="{BB05B689-8854-45E0-BBBD-25A0D9761EB8}"/>
               </a:ext>
             </a:extLst>
           </p:cNvPr>
@@ -3712,7 +3603,7 @@
     </p:spTree>
     <p:extLst>
       <p:ext uri="{BB962C8B-B14F-4D97-AF65-F5344CB8AC3E}">
-        <p14:creationId xmlns:p14="http://schemas.microsoft.com/office/powerpoint/2010/main" val="3424614265"/>
+        <p14:creationId xmlns:p14="http://schemas.microsoft.com/office/powerpoint/2010/main" val="1386289829"/>
       </p:ext>
     </p:extLst>
   </p:cSld>
@@ -3741,13 +3632,7 @@
       </p:grpSpPr>
       <p:sp>
         <p:nvSpPr>
-          <p:cNvPr id="2" name="Title 1">
-            <a:extLst>
-              <a:ext uri="{FF2B5EF4-FFF2-40B4-BE49-F238E27FC236}">
-                <a16:creationId xmlns:a16="http://schemas.microsoft.com/office/drawing/2014/main" id="{952E551F-38F8-411E-AE55-9911DE0E08A1}"/>
-              </a:ext>
-            </a:extLst>
-          </p:cNvPr>
+          <p:cNvPr id="2" name="Title 1"/>
           <p:cNvSpPr>
             <a:spLocks noGrp="1"/>
           </p:cNvSpPr>
@@ -3761,21 +3646,15 @@
           <a:lstStyle/>
           <a:p>
             <a:r>
-              <a:rPr lang="en-IE" dirty="0"/>
-              <a:t>Design</a:t>
-            </a:r>
-          </a:p>
-        </p:txBody>
-      </p:sp>
-      <p:sp>
-        <p:nvSpPr>
-          <p:cNvPr id="3" name="Text Placeholder 2">
-            <a:extLst>
-              <a:ext uri="{FF2B5EF4-FFF2-40B4-BE49-F238E27FC236}">
-                <a16:creationId xmlns:a16="http://schemas.microsoft.com/office/drawing/2014/main" id="{3436419F-E688-472B-9E13-72E3A4382023}"/>
-              </a:ext>
-            </a:extLst>
-          </p:cNvPr>
+              <a:rPr lang="en-GB" dirty="0"/>
+              <a:t>Implementation Issues</a:t>
+            </a:r>
+          </a:p>
+        </p:txBody>
+      </p:sp>
+      <p:sp>
+        <p:nvSpPr>
+          <p:cNvPr id="3" name="Text Placeholder 2"/>
           <p:cNvSpPr>
             <a:spLocks noGrp="1"/>
           </p:cNvSpPr>
@@ -3788,22 +3667,47 @@
           <a:bodyPr/>
           <a:lstStyle/>
           <a:p>
-            <a:r>
-              <a:rPr lang="en-IE" dirty="0"/>
-              <a:t>Refactored Ethics Canvas Code</a:t>
-            </a:r>
-          </a:p>
-        </p:txBody>
-      </p:sp>
-      <p:sp>
-        <p:nvSpPr>
-          <p:cNvPr id="4" name="Text Placeholder 3">
-            <a:extLst>
-              <a:ext uri="{FF2B5EF4-FFF2-40B4-BE49-F238E27FC236}">
-                <a16:creationId xmlns:a16="http://schemas.microsoft.com/office/drawing/2014/main" id="{9D316178-E05E-4D9B-8E41-3B973B5AF721}"/>
-              </a:ext>
-            </a:extLst>
-          </p:cNvPr>
+            <a:pPr marL="342900" indent="-342900">
+              <a:buFont typeface="Arial" panose="020B0604020202020204" pitchFamily="34" charset="0"/>
+              <a:buChar char="•"/>
+            </a:pPr>
+            <a:r>
+              <a:rPr lang="en-GB" dirty="0"/>
+              <a:t>Unfamiliar with Web Design</a:t>
+            </a:r>
+          </a:p>
+          <a:p>
+            <a:pPr marL="342900" indent="-342900">
+              <a:buFont typeface="Arial" panose="020B0604020202020204" pitchFamily="34" charset="0"/>
+              <a:buChar char="•"/>
+            </a:pPr>
+            <a:r>
+              <a:rPr lang="en-GB" dirty="0"/>
+              <a:t>Virtual Machine</a:t>
+            </a:r>
+          </a:p>
+          <a:p>
+            <a:pPr marL="342900" indent="-342900">
+              <a:buFont typeface="Arial" panose="020B0604020202020204" pitchFamily="34" charset="0"/>
+              <a:buChar char="•"/>
+            </a:pPr>
+            <a:r>
+              <a:rPr lang="en-GB" dirty="0"/>
+              <a:t>Un-Appealing Aesthetics</a:t>
+            </a:r>
+          </a:p>
+          <a:p>
+            <a:pPr marL="342900" indent="-342900">
+              <a:buFont typeface="Arial" panose="020B0604020202020204" pitchFamily="34" charset="0"/>
+              <a:buChar char="•"/>
+            </a:pPr>
+            <a:endParaRPr lang="en-GB" dirty="0"/>
+          </a:p>
+        </p:txBody>
+      </p:sp>
+      <p:sp>
+        <p:nvSpPr>
+          <p:cNvPr id="4" name="Text Placeholder 3"/>
           <p:cNvSpPr>
             <a:spLocks noGrp="1"/>
           </p:cNvSpPr>
@@ -3816,22 +3720,13 @@
           <a:bodyPr/>
           <a:lstStyle/>
           <a:p>
-            <a:r>
-              <a:rPr lang="en-IE" dirty="0"/>
-              <a:t>Technical Privacy Canvas</a:t>
-            </a:r>
-          </a:p>
-        </p:txBody>
-      </p:sp>
-      <p:sp>
-        <p:nvSpPr>
-          <p:cNvPr id="5" name="Slide Number Placeholder 4">
-            <a:extLst>
-              <a:ext uri="{FF2B5EF4-FFF2-40B4-BE49-F238E27FC236}">
-                <a16:creationId xmlns:a16="http://schemas.microsoft.com/office/drawing/2014/main" id="{BB05B689-8854-45E0-BBBD-25A0D9761EB8}"/>
-              </a:ext>
-            </a:extLst>
-          </p:cNvPr>
+            <a:endParaRPr lang="en-GB" dirty="0"/>
+          </a:p>
+        </p:txBody>
+      </p:sp>
+      <p:sp>
+        <p:nvSpPr>
+          <p:cNvPr id="5" name="Slide Number Placeholder 4"/>
           <p:cNvSpPr>
             <a:spLocks noGrp="1"/>
           </p:cNvSpPr>
@@ -3855,7 +3750,7 @@
     </p:spTree>
     <p:extLst>
       <p:ext uri="{BB962C8B-B14F-4D97-AF65-F5344CB8AC3E}">
-        <p14:creationId xmlns:p14="http://schemas.microsoft.com/office/powerpoint/2010/main" val="1386289829"/>
+        <p14:creationId xmlns:p14="http://schemas.microsoft.com/office/powerpoint/2010/main" val="612844625"/>
       </p:ext>
     </p:extLst>
   </p:cSld>
@@ -3899,7 +3794,7 @@
           <a:p>
             <a:r>
               <a:rPr lang="en-GB" dirty="0"/>
-              <a:t>Implementation Issues</a:t>
+              <a:t>Demo of Project</a:t>
             </a:r>
           </a:p>
         </p:txBody>
@@ -3919,11 +3814,10 @@
           <a:bodyPr/>
           <a:lstStyle/>
           <a:p>
-            <a:pPr marL="342900" indent="-342900">
-              <a:buFont typeface="Arial" panose="020B0604020202020204" pitchFamily="34" charset="0"/>
-              <a:buChar char="•"/>
-            </a:pPr>
-            <a:endParaRPr lang="en-GB" dirty="0"/>
+            <a:r>
+              <a:rPr lang="en-GB" dirty="0"/>
+              <a:t>Video</a:t>
+            </a:r>
           </a:p>
         </p:txBody>
       </p:sp>
@@ -3972,7 +3866,7 @@
     </p:spTree>
     <p:extLst>
       <p:ext uri="{BB962C8B-B14F-4D97-AF65-F5344CB8AC3E}">
-        <p14:creationId xmlns:p14="http://schemas.microsoft.com/office/powerpoint/2010/main" val="612844625"/>
+        <p14:creationId xmlns:p14="http://schemas.microsoft.com/office/powerpoint/2010/main" val="2614440668"/>
       </p:ext>
     </p:extLst>
   </p:cSld>
@@ -4001,7 +3895,13 @@
       </p:grpSpPr>
       <p:sp>
         <p:nvSpPr>
-          <p:cNvPr id="2" name="Title 1"/>
+          <p:cNvPr id="2" name="Title 1">
+            <a:extLst>
+              <a:ext uri="{FF2B5EF4-FFF2-40B4-BE49-F238E27FC236}">
+                <a16:creationId xmlns:a16="http://schemas.microsoft.com/office/drawing/2014/main" id="{92A8F40C-2D06-4741-88AF-A808238B96C6}"/>
+              </a:ext>
+            </a:extLst>
+          </p:cNvPr>
           <p:cNvSpPr>
             <a:spLocks noGrp="1"/>
           </p:cNvSpPr>
@@ -4015,15 +3915,21 @@
           <a:lstStyle/>
           <a:p>
             <a:r>
-              <a:rPr lang="en-GB" dirty="0"/>
-              <a:t>Demo of Project</a:t>
-            </a:r>
-          </a:p>
-        </p:txBody>
-      </p:sp>
-      <p:sp>
-        <p:nvSpPr>
-          <p:cNvPr id="3" name="Text Placeholder 2"/>
+              <a:rPr lang="en-IE" dirty="0"/>
+              <a:t>Screenshots</a:t>
+            </a:r>
+          </a:p>
+        </p:txBody>
+      </p:sp>
+      <p:sp>
+        <p:nvSpPr>
+          <p:cNvPr id="3" name="Text Placeholder 2">
+            <a:extLst>
+              <a:ext uri="{FF2B5EF4-FFF2-40B4-BE49-F238E27FC236}">
+                <a16:creationId xmlns:a16="http://schemas.microsoft.com/office/drawing/2014/main" id="{53287A2A-D9E1-41A5-A956-D49F431FE229}"/>
+              </a:ext>
+            </a:extLst>
+          </p:cNvPr>
           <p:cNvSpPr>
             <a:spLocks noGrp="1"/>
           </p:cNvSpPr>
@@ -4036,13 +3942,19 @@
           <a:bodyPr/>
           <a:lstStyle/>
           <a:p>
-            <a:endParaRPr lang="en-GB" dirty="0"/>
-          </a:p>
-        </p:txBody>
-      </p:sp>
-      <p:sp>
-        <p:nvSpPr>
-          <p:cNvPr id="4" name="Text Placeholder 3"/>
+            <a:endParaRPr lang="en-IE" dirty="0"/>
+          </a:p>
+        </p:txBody>
+      </p:sp>
+      <p:sp>
+        <p:nvSpPr>
+          <p:cNvPr id="4" name="Text Placeholder 3">
+            <a:extLst>
+              <a:ext uri="{FF2B5EF4-FFF2-40B4-BE49-F238E27FC236}">
+                <a16:creationId xmlns:a16="http://schemas.microsoft.com/office/drawing/2014/main" id="{2324FEE3-A393-4920-9534-1856A08009C0}"/>
+              </a:ext>
+            </a:extLst>
+          </p:cNvPr>
           <p:cNvSpPr>
             <a:spLocks noGrp="1"/>
           </p:cNvSpPr>
@@ -4055,13 +3967,19 @@
           <a:bodyPr/>
           <a:lstStyle/>
           <a:p>
-            <a:endParaRPr lang="en-GB" dirty="0"/>
-          </a:p>
-        </p:txBody>
-      </p:sp>
-      <p:sp>
-        <p:nvSpPr>
-          <p:cNvPr id="5" name="Slide Number Placeholder 4"/>
+            <a:endParaRPr lang="en-IE"/>
+          </a:p>
+        </p:txBody>
+      </p:sp>
+      <p:sp>
+        <p:nvSpPr>
+          <p:cNvPr id="5" name="Slide Number Placeholder 4">
+            <a:extLst>
+              <a:ext uri="{FF2B5EF4-FFF2-40B4-BE49-F238E27FC236}">
+                <a16:creationId xmlns:a16="http://schemas.microsoft.com/office/drawing/2014/main" id="{8C228956-1E1E-4303-B2D8-3126AA1AF2C4}"/>
+              </a:ext>
+            </a:extLst>
+          </p:cNvPr>
           <p:cNvSpPr>
             <a:spLocks noGrp="1"/>
           </p:cNvSpPr>
@@ -4082,10 +4000,46 @@
           </a:p>
         </p:txBody>
       </p:sp>
+      <p:pic>
+        <p:nvPicPr>
+          <p:cNvPr id="7" name="Picture 6">
+            <a:extLst>
+              <a:ext uri="{FF2B5EF4-FFF2-40B4-BE49-F238E27FC236}">
+                <a16:creationId xmlns:a16="http://schemas.microsoft.com/office/drawing/2014/main" id="{BE3274A9-33F3-4A99-B6E3-255987CA9624}"/>
+              </a:ext>
+            </a:extLst>
+          </p:cNvPr>
+          <p:cNvPicPr>
+            <a:picLocks noChangeAspect="1"/>
+          </p:cNvPicPr>
+          <p:nvPr/>
+        </p:nvPicPr>
+        <p:blipFill>
+          <a:blip r:embed="rId2">
+            <a:extLst>
+              <a:ext uri="{28A0092B-C50C-407E-A947-70E740481C1C}">
+                <a14:useLocalDpi xmlns:a14="http://schemas.microsoft.com/office/drawing/2010/main" val="0"/>
+              </a:ext>
+            </a:extLst>
+          </a:blip>
+          <a:stretch>
+            <a:fillRect/>
+          </a:stretch>
+        </p:blipFill>
+        <p:spPr>
+          <a:xfrm>
+            <a:off x="741893" y="1476000"/>
+            <a:ext cx="7573432" cy="4801270"/>
+          </a:xfrm>
+          <a:prstGeom prst="rect">
+            <a:avLst/>
+          </a:prstGeom>
+        </p:spPr>
+      </p:pic>
     </p:spTree>
     <p:extLst>
       <p:ext uri="{BB962C8B-B14F-4D97-AF65-F5344CB8AC3E}">
-        <p14:creationId xmlns:p14="http://schemas.microsoft.com/office/powerpoint/2010/main" val="2614440668"/>
+        <p14:creationId xmlns:p14="http://schemas.microsoft.com/office/powerpoint/2010/main" val="1956243797"/>
       </p:ext>
     </p:extLst>
   </p:cSld>
@@ -4114,7 +4068,13 @@
       </p:grpSpPr>
       <p:sp>
         <p:nvSpPr>
-          <p:cNvPr id="2" name="Title 1"/>
+          <p:cNvPr id="2" name="Title 1">
+            <a:extLst>
+              <a:ext uri="{FF2B5EF4-FFF2-40B4-BE49-F238E27FC236}">
+                <a16:creationId xmlns:a16="http://schemas.microsoft.com/office/drawing/2014/main" id="{1656B109-0FCD-4FD8-A667-39B88CB7E9DF}"/>
+              </a:ext>
+            </a:extLst>
+          </p:cNvPr>
           <p:cNvSpPr>
             <a:spLocks noGrp="1"/>
           </p:cNvSpPr>
@@ -4128,15 +4088,21 @@
           <a:lstStyle/>
           <a:p>
             <a:r>
-              <a:rPr lang="en-GB" dirty="0"/>
-              <a:t>Evaluation</a:t>
-            </a:r>
-          </a:p>
-        </p:txBody>
-      </p:sp>
-      <p:sp>
-        <p:nvSpPr>
-          <p:cNvPr id="3" name="Text Placeholder 2"/>
+              <a:rPr lang="en-IE" dirty="0"/>
+              <a:t>Screenshots</a:t>
+            </a:r>
+          </a:p>
+        </p:txBody>
+      </p:sp>
+      <p:sp>
+        <p:nvSpPr>
+          <p:cNvPr id="3" name="Text Placeholder 2">
+            <a:extLst>
+              <a:ext uri="{FF2B5EF4-FFF2-40B4-BE49-F238E27FC236}">
+                <a16:creationId xmlns:a16="http://schemas.microsoft.com/office/drawing/2014/main" id="{7AA599D9-87A1-4899-B532-5D599C757239}"/>
+              </a:ext>
+            </a:extLst>
+          </p:cNvPr>
           <p:cNvSpPr>
             <a:spLocks noGrp="1"/>
           </p:cNvSpPr>
@@ -4149,41 +4115,19 @@
           <a:bodyPr/>
           <a:lstStyle/>
           <a:p>
-            <a:r>
-              <a:rPr lang="en-GB" dirty="0"/>
-              <a:t>Diagrams</a:t>
-            </a:r>
-          </a:p>
-          <a:p>
-            <a:pPr lvl="1"/>
-            <a:r>
-              <a:rPr lang="en-GB" dirty="0"/>
-              <a:t>Resolution of diagrams should be adequate i.e. lines should not be blurred, fonts should be easily readable</a:t>
-            </a:r>
-          </a:p>
-          <a:p>
-            <a:pPr lvl="1"/>
-            <a:r>
-              <a:rPr lang="en-GB" dirty="0"/>
-              <a:t>Axes on graphs should have names and units</a:t>
-            </a:r>
-          </a:p>
-          <a:p>
-            <a:pPr lvl="1"/>
-            <a:r>
-              <a:rPr lang="en-GB" dirty="0"/>
-              <a:t>Graphs should have legends</a:t>
-            </a:r>
-          </a:p>
-          <a:p>
-            <a:pPr lvl="1"/>
-            <a:endParaRPr lang="en-GB" dirty="0"/>
-          </a:p>
-        </p:txBody>
-      </p:sp>
-      <p:sp>
-        <p:nvSpPr>
-          <p:cNvPr id="4" name="Text Placeholder 3"/>
+            <a:endParaRPr lang="en-IE" dirty="0"/>
+          </a:p>
+        </p:txBody>
+      </p:sp>
+      <p:sp>
+        <p:nvSpPr>
+          <p:cNvPr id="4" name="Text Placeholder 3">
+            <a:extLst>
+              <a:ext uri="{FF2B5EF4-FFF2-40B4-BE49-F238E27FC236}">
+                <a16:creationId xmlns:a16="http://schemas.microsoft.com/office/drawing/2014/main" id="{057A26A4-63E5-4C1B-A0F5-8EB700A8AF4B}"/>
+              </a:ext>
+            </a:extLst>
+          </p:cNvPr>
           <p:cNvSpPr>
             <a:spLocks noGrp="1"/>
           </p:cNvSpPr>
@@ -4196,13 +4140,19 @@
           <a:bodyPr/>
           <a:lstStyle/>
           <a:p>
-            <a:endParaRPr lang="en-GB" dirty="0"/>
-          </a:p>
-        </p:txBody>
-      </p:sp>
-      <p:sp>
-        <p:nvSpPr>
-          <p:cNvPr id="5" name="Slide Number Placeholder 4"/>
+            <a:endParaRPr lang="en-IE"/>
+          </a:p>
+        </p:txBody>
+      </p:sp>
+      <p:sp>
+        <p:nvSpPr>
+          <p:cNvPr id="5" name="Slide Number Placeholder 4">
+            <a:extLst>
+              <a:ext uri="{FF2B5EF4-FFF2-40B4-BE49-F238E27FC236}">
+                <a16:creationId xmlns:a16="http://schemas.microsoft.com/office/drawing/2014/main" id="{C9B2B33B-B0F2-45DE-8C43-334F63F19D72}"/>
+              </a:ext>
+            </a:extLst>
+          </p:cNvPr>
           <p:cNvSpPr>
             <a:spLocks noGrp="1"/>
           </p:cNvSpPr>
@@ -4223,10 +4173,46 @@
           </a:p>
         </p:txBody>
       </p:sp>
+      <p:pic>
+        <p:nvPicPr>
+          <p:cNvPr id="7" name="Picture 6">
+            <a:extLst>
+              <a:ext uri="{FF2B5EF4-FFF2-40B4-BE49-F238E27FC236}">
+                <a16:creationId xmlns:a16="http://schemas.microsoft.com/office/drawing/2014/main" id="{10C96DB7-B15F-42CF-A921-36C51529DC3B}"/>
+              </a:ext>
+            </a:extLst>
+          </p:cNvPr>
+          <p:cNvPicPr>
+            <a:picLocks noChangeAspect="1"/>
+          </p:cNvPicPr>
+          <p:nvPr/>
+        </p:nvPicPr>
+        <p:blipFill>
+          <a:blip r:embed="rId2">
+            <a:extLst>
+              <a:ext uri="{28A0092B-C50C-407E-A947-70E740481C1C}">
+                <a14:useLocalDpi xmlns:a14="http://schemas.microsoft.com/office/drawing/2010/main" val="0"/>
+              </a:ext>
+            </a:extLst>
+          </a:blip>
+          <a:stretch>
+            <a:fillRect/>
+          </a:stretch>
+        </p:blipFill>
+        <p:spPr>
+          <a:xfrm>
+            <a:off x="814387" y="1567730"/>
+            <a:ext cx="7401958" cy="4353533"/>
+          </a:xfrm>
+          <a:prstGeom prst="rect">
+            <a:avLst/>
+          </a:prstGeom>
+        </p:spPr>
+      </p:pic>
     </p:spTree>
     <p:extLst>
       <p:ext uri="{BB962C8B-B14F-4D97-AF65-F5344CB8AC3E}">
-        <p14:creationId xmlns:p14="http://schemas.microsoft.com/office/powerpoint/2010/main" val="3212662378"/>
+        <p14:creationId xmlns:p14="http://schemas.microsoft.com/office/powerpoint/2010/main" val="2364655432"/>
       </p:ext>
     </p:extLst>
   </p:cSld>
@@ -4255,7 +4241,13 @@
       </p:grpSpPr>
       <p:sp>
         <p:nvSpPr>
-          <p:cNvPr id="2" name="Title 1"/>
+          <p:cNvPr id="2" name="Title 1">
+            <a:extLst>
+              <a:ext uri="{FF2B5EF4-FFF2-40B4-BE49-F238E27FC236}">
+                <a16:creationId xmlns:a16="http://schemas.microsoft.com/office/drawing/2014/main" id="{36546091-2D97-4D1C-905D-D885D9E35ED4}"/>
+              </a:ext>
+            </a:extLst>
+          </p:cNvPr>
           <p:cNvSpPr>
             <a:spLocks noGrp="1"/>
           </p:cNvSpPr>
@@ -4268,16 +4260,19 @@
           <a:bodyPr/>
           <a:lstStyle/>
           <a:p>
-            <a:r>
-              <a:rPr lang="en-GB" dirty="0"/>
-              <a:t>Conclusions</a:t>
-            </a:r>
-          </a:p>
-        </p:txBody>
-      </p:sp>
-      <p:sp>
-        <p:nvSpPr>
-          <p:cNvPr id="3" name="Text Placeholder 2"/>
+            <a:endParaRPr lang="en-IE"/>
+          </a:p>
+        </p:txBody>
+      </p:sp>
+      <p:sp>
+        <p:nvSpPr>
+          <p:cNvPr id="3" name="Text Placeholder 2">
+            <a:extLst>
+              <a:ext uri="{FF2B5EF4-FFF2-40B4-BE49-F238E27FC236}">
+                <a16:creationId xmlns:a16="http://schemas.microsoft.com/office/drawing/2014/main" id="{8FC1424E-CB07-49D6-A467-3DAA7C2F8E6D}"/>
+              </a:ext>
+            </a:extLst>
+          </p:cNvPr>
           <p:cNvSpPr>
             <a:spLocks noGrp="1"/>
           </p:cNvSpPr>
@@ -4290,25 +4285,19 @@
           <a:bodyPr/>
           <a:lstStyle/>
           <a:p>
-            <a:r>
-              <a:rPr lang="en-GB" dirty="0"/>
-              <a:t>Lessons learnt</a:t>
-            </a:r>
-          </a:p>
-          <a:p>
-            <a:endParaRPr lang="en-GB" dirty="0"/>
-          </a:p>
-          <a:p>
-            <a:r>
-              <a:rPr lang="en-GB" dirty="0"/>
-              <a:t>Reflection</a:t>
-            </a:r>
-          </a:p>
-        </p:txBody>
-      </p:sp>
-      <p:sp>
-        <p:nvSpPr>
-          <p:cNvPr id="4" name="Text Placeholder 3"/>
+            <a:endParaRPr lang="en-IE" dirty="0"/>
+          </a:p>
+        </p:txBody>
+      </p:sp>
+      <p:sp>
+        <p:nvSpPr>
+          <p:cNvPr id="4" name="Text Placeholder 3">
+            <a:extLst>
+              <a:ext uri="{FF2B5EF4-FFF2-40B4-BE49-F238E27FC236}">
+                <a16:creationId xmlns:a16="http://schemas.microsoft.com/office/drawing/2014/main" id="{A642BC27-81F7-4B6E-BEA1-774ABACCFB2F}"/>
+              </a:ext>
+            </a:extLst>
+          </p:cNvPr>
           <p:cNvSpPr>
             <a:spLocks noGrp="1"/>
           </p:cNvSpPr>
@@ -4321,13 +4310,19 @@
           <a:bodyPr/>
           <a:lstStyle/>
           <a:p>
-            <a:endParaRPr lang="en-GB" dirty="0"/>
-          </a:p>
-        </p:txBody>
-      </p:sp>
-      <p:sp>
-        <p:nvSpPr>
-          <p:cNvPr id="5" name="Slide Number Placeholder 4"/>
+            <a:endParaRPr lang="en-IE"/>
+          </a:p>
+        </p:txBody>
+      </p:sp>
+      <p:sp>
+        <p:nvSpPr>
+          <p:cNvPr id="5" name="Slide Number Placeholder 4">
+            <a:extLst>
+              <a:ext uri="{FF2B5EF4-FFF2-40B4-BE49-F238E27FC236}">
+                <a16:creationId xmlns:a16="http://schemas.microsoft.com/office/drawing/2014/main" id="{479E6A40-133A-48AC-B2A4-4FD3B15D0040}"/>
+              </a:ext>
+            </a:extLst>
+          </p:cNvPr>
           <p:cNvSpPr>
             <a:spLocks noGrp="1"/>
           </p:cNvSpPr>
@@ -4348,10 +4343,46 @@
           </a:p>
         </p:txBody>
       </p:sp>
+      <p:pic>
+        <p:nvPicPr>
+          <p:cNvPr id="7" name="Picture 6">
+            <a:extLst>
+              <a:ext uri="{FF2B5EF4-FFF2-40B4-BE49-F238E27FC236}">
+                <a16:creationId xmlns:a16="http://schemas.microsoft.com/office/drawing/2014/main" id="{2B7696B9-7330-49D6-94C0-DA274959B977}"/>
+              </a:ext>
+            </a:extLst>
+          </p:cNvPr>
+          <p:cNvPicPr>
+            <a:picLocks noChangeAspect="1"/>
+          </p:cNvPicPr>
+          <p:nvPr/>
+        </p:nvPicPr>
+        <p:blipFill>
+          <a:blip r:embed="rId2">
+            <a:extLst>
+              <a:ext uri="{28A0092B-C50C-407E-A947-70E740481C1C}">
+                <a14:useLocalDpi xmlns:a14="http://schemas.microsoft.com/office/drawing/2010/main" val="0"/>
+              </a:ext>
+            </a:extLst>
+          </a:blip>
+          <a:stretch>
+            <a:fillRect/>
+          </a:stretch>
+        </p:blipFill>
+        <p:spPr>
+          <a:xfrm>
+            <a:off x="734874" y="1520670"/>
+            <a:ext cx="7382905" cy="4344006"/>
+          </a:xfrm>
+          <a:prstGeom prst="rect">
+            <a:avLst/>
+          </a:prstGeom>
+        </p:spPr>
+      </p:pic>
     </p:spTree>
     <p:extLst>
       <p:ext uri="{BB962C8B-B14F-4D97-AF65-F5344CB8AC3E}">
-        <p14:creationId xmlns:p14="http://schemas.microsoft.com/office/powerpoint/2010/main" val="1748537951"/>
+        <p14:creationId xmlns:p14="http://schemas.microsoft.com/office/powerpoint/2010/main" val="4242713136"/>
       </p:ext>
     </p:extLst>
   </p:cSld>
@@ -4380,36 +4411,148 @@
       </p:grpSpPr>
       <p:sp>
         <p:nvSpPr>
-          <p:cNvPr id="2" name="Title 1"/>
-          <p:cNvSpPr>
-            <a:spLocks noGrp="1"/>
-          </p:cNvSpPr>
-          <p:nvPr>
-            <p:ph type="ctrTitle"/>
-          </p:nvPr>
-        </p:nvSpPr>
+          <p:cNvPr id="2" name="Title 1">
+            <a:extLst>
+              <a:ext uri="{FF2B5EF4-FFF2-40B4-BE49-F238E27FC236}">
+                <a16:creationId xmlns:a16="http://schemas.microsoft.com/office/drawing/2014/main" id="{0571A2D1-6D29-4374-94F1-28C72F173D0C}"/>
+              </a:ext>
+            </a:extLst>
+          </p:cNvPr>
+          <p:cNvSpPr>
+            <a:spLocks noGrp="1"/>
+          </p:cNvSpPr>
+          <p:nvPr>
+            <p:ph type="title"/>
+          </p:nvPr>
+        </p:nvSpPr>
+        <p:spPr/>
+        <p:txBody>
+          <a:bodyPr/>
+          <a:lstStyle/>
+          <a:p>
+            <a:endParaRPr lang="en-IE"/>
+          </a:p>
+        </p:txBody>
+      </p:sp>
+      <p:sp>
+        <p:nvSpPr>
+          <p:cNvPr id="3" name="Text Placeholder 2">
+            <a:extLst>
+              <a:ext uri="{FF2B5EF4-FFF2-40B4-BE49-F238E27FC236}">
+                <a16:creationId xmlns:a16="http://schemas.microsoft.com/office/drawing/2014/main" id="{04B43F2F-56C5-4A4D-A93D-CCCCC408ED58}"/>
+              </a:ext>
+            </a:extLst>
+          </p:cNvPr>
+          <p:cNvSpPr>
+            <a:spLocks noGrp="1"/>
+          </p:cNvSpPr>
+          <p:nvPr>
+            <p:ph type="body" sz="quarter" idx="10"/>
+          </p:nvPr>
+        </p:nvSpPr>
+        <p:spPr/>
+        <p:txBody>
+          <a:bodyPr/>
+          <a:lstStyle/>
+          <a:p>
+            <a:endParaRPr lang="en-IE" dirty="0"/>
+          </a:p>
+        </p:txBody>
+      </p:sp>
+      <p:sp>
+        <p:nvSpPr>
+          <p:cNvPr id="4" name="Text Placeholder 3">
+            <a:extLst>
+              <a:ext uri="{FF2B5EF4-FFF2-40B4-BE49-F238E27FC236}">
+                <a16:creationId xmlns:a16="http://schemas.microsoft.com/office/drawing/2014/main" id="{1E77911A-3BFA-434A-985F-85C9D3404426}"/>
+              </a:ext>
+            </a:extLst>
+          </p:cNvPr>
+          <p:cNvSpPr>
+            <a:spLocks noGrp="1"/>
+          </p:cNvSpPr>
+          <p:nvPr>
+            <p:ph type="body" sz="quarter" idx="11"/>
+          </p:nvPr>
+        </p:nvSpPr>
+        <p:spPr/>
+        <p:txBody>
+          <a:bodyPr/>
+          <a:lstStyle/>
+          <a:p>
+            <a:endParaRPr lang="en-IE"/>
+          </a:p>
+        </p:txBody>
+      </p:sp>
+      <p:sp>
+        <p:nvSpPr>
+          <p:cNvPr id="5" name="Slide Number Placeholder 4">
+            <a:extLst>
+              <a:ext uri="{FF2B5EF4-FFF2-40B4-BE49-F238E27FC236}">
+                <a16:creationId xmlns:a16="http://schemas.microsoft.com/office/drawing/2014/main" id="{7C193F23-6F95-413B-8985-373F6025B359}"/>
+              </a:ext>
+            </a:extLst>
+          </p:cNvPr>
+          <p:cNvSpPr>
+            <a:spLocks noGrp="1"/>
+          </p:cNvSpPr>
+          <p:nvPr>
+            <p:ph type="sldNum" sz="quarter" idx="12"/>
+          </p:nvPr>
+        </p:nvSpPr>
+        <p:spPr/>
+        <p:txBody>
+          <a:bodyPr/>
+          <a:lstStyle/>
+          <a:p>
+            <a:fld id="{7D300DB9-A23F-43BD-B7EF-862D750C72E7}" type="slidenum">
+              <a:rPr lang="en-IE" smtClean="0"/>
+              <a:t>18</a:t>
+            </a:fld>
+            <a:endParaRPr lang="en-IE"/>
+          </a:p>
+        </p:txBody>
+      </p:sp>
+      <p:pic>
+        <p:nvPicPr>
+          <p:cNvPr id="7" name="Picture 6">
+            <a:extLst>
+              <a:ext uri="{FF2B5EF4-FFF2-40B4-BE49-F238E27FC236}">
+                <a16:creationId xmlns:a16="http://schemas.microsoft.com/office/drawing/2014/main" id="{FAAADAEB-2924-495F-8907-C326C11BBAD1}"/>
+              </a:ext>
+            </a:extLst>
+          </p:cNvPr>
+          <p:cNvPicPr>
+            <a:picLocks noChangeAspect="1"/>
+          </p:cNvPicPr>
+          <p:nvPr/>
+        </p:nvPicPr>
+        <p:blipFill>
+          <a:blip r:embed="rId2">
+            <a:extLst>
+              <a:ext uri="{28A0092B-C50C-407E-A947-70E740481C1C}">
+                <a14:useLocalDpi xmlns:a14="http://schemas.microsoft.com/office/drawing/2010/main" val="0"/>
+              </a:ext>
+            </a:extLst>
+          </a:blip>
+          <a:stretch>
+            <a:fillRect/>
+          </a:stretch>
+        </p:blipFill>
         <p:spPr>
           <a:xfrm>
-            <a:off x="828674" y="3131618"/>
-            <a:ext cx="7500939" cy="647363"/>
+            <a:off x="728246" y="1476000"/>
+            <a:ext cx="7440063" cy="4744112"/>
           </a:xfrm>
+          <a:prstGeom prst="rect">
+            <a:avLst/>
+          </a:prstGeom>
         </p:spPr>
-        <p:txBody>
-          <a:bodyPr/>
-          <a:lstStyle/>
-          <a:p>
-            <a:pPr algn="ctr"/>
-            <a:r>
-              <a:rPr lang="en-GB" sz="5400" dirty="0"/>
-              <a:t>Questions ?</a:t>
-            </a:r>
-          </a:p>
-        </p:txBody>
-      </p:sp>
+      </p:pic>
     </p:spTree>
     <p:extLst>
       <p:ext uri="{BB962C8B-B14F-4D97-AF65-F5344CB8AC3E}">
-        <p14:creationId xmlns:p14="http://schemas.microsoft.com/office/powerpoint/2010/main" val="173462149"/>
+        <p14:creationId xmlns:p14="http://schemas.microsoft.com/office/powerpoint/2010/main" val="3488848778"/>
       </p:ext>
     </p:extLst>
   </p:cSld>
@@ -4438,30 +4581,141 @@
       </p:grpSpPr>
       <p:sp>
         <p:nvSpPr>
-          <p:cNvPr id="2" name="Title 1"/>
-          <p:cNvSpPr>
-            <a:spLocks noGrp="1"/>
-          </p:cNvSpPr>
-          <p:nvPr>
-            <p:ph type="ctrTitle"/>
-          </p:nvPr>
-        </p:nvSpPr>
-        <p:spPr/>
-        <p:txBody>
-          <a:bodyPr/>
-          <a:lstStyle/>
-          <a:p>
-            <a:r>
-              <a:rPr lang="en-GB"/>
-              <a:t>Thank You</a:t>
-            </a:r>
+          <p:cNvPr id="2" name="Title 1">
+            <a:extLst>
+              <a:ext uri="{FF2B5EF4-FFF2-40B4-BE49-F238E27FC236}">
+                <a16:creationId xmlns:a16="http://schemas.microsoft.com/office/drawing/2014/main" id="{047AC767-D79B-41B0-BC04-7B430A3220DB}"/>
+              </a:ext>
+            </a:extLst>
+          </p:cNvPr>
+          <p:cNvSpPr>
+            <a:spLocks noGrp="1"/>
+          </p:cNvSpPr>
+          <p:nvPr>
+            <p:ph type="title"/>
+          </p:nvPr>
+        </p:nvSpPr>
+        <p:spPr/>
+        <p:txBody>
+          <a:bodyPr/>
+          <a:lstStyle/>
+          <a:p>
+            <a:r>
+              <a:rPr lang="en-IE" dirty="0"/>
+              <a:t>Evaluation</a:t>
+            </a:r>
+          </a:p>
+        </p:txBody>
+      </p:sp>
+      <p:sp>
+        <p:nvSpPr>
+          <p:cNvPr id="3" name="Text Placeholder 2">
+            <a:extLst>
+              <a:ext uri="{FF2B5EF4-FFF2-40B4-BE49-F238E27FC236}">
+                <a16:creationId xmlns:a16="http://schemas.microsoft.com/office/drawing/2014/main" id="{5C761DAF-2F3C-43F7-AA85-A37707954650}"/>
+              </a:ext>
+            </a:extLst>
+          </p:cNvPr>
+          <p:cNvSpPr>
+            <a:spLocks noGrp="1"/>
+          </p:cNvSpPr>
+          <p:nvPr>
+            <p:ph type="body" sz="quarter" idx="10"/>
+          </p:nvPr>
+        </p:nvSpPr>
+        <p:spPr/>
+        <p:txBody>
+          <a:bodyPr/>
+          <a:lstStyle/>
+          <a:p>
+            <a:r>
+              <a:rPr lang="en-IE" dirty="0"/>
+              <a:t>Testing (</a:t>
+            </a:r>
+            <a:r>
+              <a:rPr lang="en-IE" dirty="0" err="1"/>
+              <a:t>atm</a:t>
+            </a:r>
+            <a:r>
+              <a:rPr lang="en-IE" dirty="0"/>
+              <a:t>)</a:t>
+            </a:r>
+          </a:p>
+          <a:p>
+            <a:r>
+              <a:rPr lang="en-IE" dirty="0"/>
+              <a:t>Selection of Participants (BMC)</a:t>
+            </a:r>
+          </a:p>
+          <a:p>
+            <a:r>
+              <a:rPr lang="en-IE" dirty="0"/>
+              <a:t>Online Survey</a:t>
+            </a:r>
+          </a:p>
+          <a:p>
+            <a:endParaRPr lang="en-IE" dirty="0"/>
+          </a:p>
+        </p:txBody>
+      </p:sp>
+      <p:sp>
+        <p:nvSpPr>
+          <p:cNvPr id="4" name="Text Placeholder 3">
+            <a:extLst>
+              <a:ext uri="{FF2B5EF4-FFF2-40B4-BE49-F238E27FC236}">
+                <a16:creationId xmlns:a16="http://schemas.microsoft.com/office/drawing/2014/main" id="{76A6A839-C64C-4D6B-B56C-47B346B5202E}"/>
+              </a:ext>
+            </a:extLst>
+          </p:cNvPr>
+          <p:cNvSpPr>
+            <a:spLocks noGrp="1"/>
+          </p:cNvSpPr>
+          <p:nvPr>
+            <p:ph type="body" sz="quarter" idx="11"/>
+          </p:nvPr>
+        </p:nvSpPr>
+        <p:spPr/>
+        <p:txBody>
+          <a:bodyPr/>
+          <a:lstStyle/>
+          <a:p>
+            <a:endParaRPr lang="en-IE"/>
+          </a:p>
+        </p:txBody>
+      </p:sp>
+      <p:sp>
+        <p:nvSpPr>
+          <p:cNvPr id="5" name="Slide Number Placeholder 4">
+            <a:extLst>
+              <a:ext uri="{FF2B5EF4-FFF2-40B4-BE49-F238E27FC236}">
+                <a16:creationId xmlns:a16="http://schemas.microsoft.com/office/drawing/2014/main" id="{BFFA832D-69E7-4D45-9C8C-73C5B2C8CB30}"/>
+              </a:ext>
+            </a:extLst>
+          </p:cNvPr>
+          <p:cNvSpPr>
+            <a:spLocks noGrp="1"/>
+          </p:cNvSpPr>
+          <p:nvPr>
+            <p:ph type="sldNum" sz="quarter" idx="12"/>
+          </p:nvPr>
+        </p:nvSpPr>
+        <p:spPr/>
+        <p:txBody>
+          <a:bodyPr/>
+          <a:lstStyle/>
+          <a:p>
+            <a:fld id="{7D300DB9-A23F-43BD-B7EF-862D750C72E7}" type="slidenum">
+              <a:rPr lang="en-IE" smtClean="0"/>
+              <a:t>19</a:t>
+            </a:fld>
+            <a:endParaRPr lang="en-IE"/>
           </a:p>
         </p:txBody>
       </p:sp>
     </p:spTree>
     <p:extLst>
       <p:ext uri="{BB962C8B-B14F-4D97-AF65-F5344CB8AC3E}">
-        <p14:creationId xmlns:p14="http://schemas.microsoft.com/office/powerpoint/2010/main" val="730746180"/>
+        <p14:creationId xmlns:p14="http://schemas.microsoft.com/office/powerpoint/2010/main" val="21436945"/>
       </p:ext>
     </p:extLst>
   </p:cSld>
@@ -4490,7 +4744,13 @@
       </p:grpSpPr>
       <p:sp>
         <p:nvSpPr>
-          <p:cNvPr id="2" name="Title 1"/>
+          <p:cNvPr id="2" name="Title 1">
+            <a:extLst>
+              <a:ext uri="{FF2B5EF4-FFF2-40B4-BE49-F238E27FC236}">
+                <a16:creationId xmlns:a16="http://schemas.microsoft.com/office/drawing/2014/main" id="{CB36699C-98BB-4487-870B-1D3EC9D4B1FE}"/>
+              </a:ext>
+            </a:extLst>
+          </p:cNvPr>
           <p:cNvSpPr>
             <a:spLocks noGrp="1"/>
           </p:cNvSpPr>
@@ -4504,15 +4764,21 @@
           <a:lstStyle/>
           <a:p>
             <a:r>
-              <a:rPr lang="en-GB" dirty="0"/>
-              <a:t>Overview</a:t>
-            </a:r>
-          </a:p>
-        </p:txBody>
-      </p:sp>
-      <p:sp>
-        <p:nvSpPr>
-          <p:cNvPr id="3" name="Text Placeholder 2"/>
+              <a:rPr lang="en-IE" dirty="0"/>
+              <a:t>Privacy Canvas – The Problem</a:t>
+            </a:r>
+          </a:p>
+        </p:txBody>
+      </p:sp>
+      <p:sp>
+        <p:nvSpPr>
+          <p:cNvPr id="3" name="Text Placeholder 2">
+            <a:extLst>
+              <a:ext uri="{FF2B5EF4-FFF2-40B4-BE49-F238E27FC236}">
+                <a16:creationId xmlns:a16="http://schemas.microsoft.com/office/drawing/2014/main" id="{719B2736-546A-44E5-AE4A-6AD254DEDABE}"/>
+              </a:ext>
+            </a:extLst>
+          </p:cNvPr>
           <p:cNvSpPr>
             <a:spLocks noGrp="1"/>
           </p:cNvSpPr>
@@ -4525,77 +4791,50 @@
           <a:bodyPr/>
           <a:lstStyle/>
           <a:p>
-            <a:pPr marL="342900" indent="-342900">
-              <a:buFont typeface="Arial" panose="020B0604020202020204" pitchFamily="34" charset="0"/>
-              <a:buChar char="•"/>
-            </a:pPr>
-            <a:r>
-              <a:rPr lang="en-GB" dirty="0"/>
-              <a:t>Background</a:t>
-            </a:r>
-          </a:p>
-          <a:p>
-            <a:pPr marL="342900" indent="-342900">
-              <a:buFont typeface="Arial" panose="020B0604020202020204" pitchFamily="34" charset="0"/>
-              <a:buChar char="•"/>
-            </a:pPr>
-            <a:r>
-              <a:rPr lang="en-GB" dirty="0"/>
-              <a:t>Design</a:t>
-            </a:r>
-          </a:p>
-          <a:p>
-            <a:pPr marL="342900" indent="-342900">
-              <a:buFont typeface="Arial" panose="020B0604020202020204" pitchFamily="34" charset="0"/>
-              <a:buChar char="•"/>
-            </a:pPr>
-            <a:r>
-              <a:rPr lang="en-GB" dirty="0"/>
-              <a:t>Implementation Issues</a:t>
-            </a:r>
-          </a:p>
-          <a:p>
-            <a:pPr marL="342900" indent="-342900">
-              <a:buFont typeface="Arial" panose="020B0604020202020204" pitchFamily="34" charset="0"/>
-              <a:buChar char="•"/>
-            </a:pPr>
-            <a:r>
-              <a:rPr lang="en-GB" dirty="0"/>
-              <a:t>Demo of Artefact</a:t>
-            </a:r>
-          </a:p>
-          <a:p>
-            <a:pPr marL="342900" indent="-342900">
-              <a:buFont typeface="Arial" panose="020B0604020202020204" pitchFamily="34" charset="0"/>
-              <a:buChar char="•"/>
-            </a:pPr>
-            <a:r>
-              <a:rPr lang="en-GB" dirty="0"/>
-              <a:t>Evaluation</a:t>
-            </a:r>
-          </a:p>
-          <a:p>
-            <a:pPr marL="342900" indent="-342900">
-              <a:buFont typeface="Arial" panose="020B0604020202020204" pitchFamily="34" charset="0"/>
-              <a:buChar char="•"/>
-            </a:pPr>
-            <a:r>
-              <a:rPr lang="en-GB" dirty="0"/>
-              <a:t>Conclusions</a:t>
-            </a:r>
-          </a:p>
-          <a:p>
-            <a:pPr marL="342900" indent="-342900">
-              <a:buFont typeface="Arial" panose="020B0604020202020204" pitchFamily="34" charset="0"/>
-              <a:buChar char="•"/>
-            </a:pPr>
-            <a:endParaRPr lang="en-GB" dirty="0"/>
-          </a:p>
-        </p:txBody>
-      </p:sp>
-      <p:sp>
-        <p:nvSpPr>
-          <p:cNvPr id="4" name="Text Placeholder 3"/>
+            <a:r>
+              <a:rPr lang="en-IE" dirty="0"/>
+              <a:t>“This project will refactor or redesign the ethics canvas code to offer a canvas style interface for brainstorming the data protection issues in a digital application design, in a way suitable for supporting training in this topic in remote groups”</a:t>
+            </a:r>
+          </a:p>
+          <a:p>
+            <a:r>
+              <a:rPr lang="en-IE" dirty="0"/>
+              <a:t>Building on previous work(Peter, Ethics Canvas)</a:t>
+            </a:r>
+          </a:p>
+          <a:p>
+            <a:r>
+              <a:rPr lang="en-IE" dirty="0"/>
+              <a:t>My novel input (alongside </a:t>
+            </a:r>
+            <a:r>
+              <a:rPr lang="en-IE" dirty="0" err="1"/>
+              <a:t>bmc</a:t>
+            </a:r>
+            <a:r>
+              <a:rPr lang="en-IE" dirty="0"/>
+              <a:t>, intro to GDPR(intro May2018), </a:t>
+            </a:r>
+            <a:r>
+              <a:rPr lang="en-IE" dirty="0" err="1"/>
+              <a:t>PbD</a:t>
+            </a:r>
+            <a:r>
+              <a:rPr lang="en-IE" dirty="0"/>
+              <a:t>)</a:t>
+            </a:r>
+          </a:p>
+        </p:txBody>
+      </p:sp>
+      <p:sp>
+        <p:nvSpPr>
+          <p:cNvPr id="4" name="Text Placeholder 3">
+            <a:extLst>
+              <a:ext uri="{FF2B5EF4-FFF2-40B4-BE49-F238E27FC236}">
+                <a16:creationId xmlns:a16="http://schemas.microsoft.com/office/drawing/2014/main" id="{164BC214-CFA6-479A-A589-E51D08A86B7E}"/>
+              </a:ext>
+            </a:extLst>
+          </p:cNvPr>
           <p:cNvSpPr>
             <a:spLocks noGrp="1"/>
           </p:cNvSpPr>
@@ -4608,13 +4847,19 @@
           <a:bodyPr/>
           <a:lstStyle/>
           <a:p>
-            <a:endParaRPr lang="en-GB" dirty="0"/>
-          </a:p>
-        </p:txBody>
-      </p:sp>
-      <p:sp>
-        <p:nvSpPr>
-          <p:cNvPr id="5" name="Slide Number Placeholder 4"/>
+            <a:endParaRPr lang="en-IE"/>
+          </a:p>
+        </p:txBody>
+      </p:sp>
+      <p:sp>
+        <p:nvSpPr>
+          <p:cNvPr id="5" name="Slide Number Placeholder 4">
+            <a:extLst>
+              <a:ext uri="{FF2B5EF4-FFF2-40B4-BE49-F238E27FC236}">
+                <a16:creationId xmlns:a16="http://schemas.microsoft.com/office/drawing/2014/main" id="{894077AE-03B4-4833-AF6E-D2C16F6247CD}"/>
+              </a:ext>
+            </a:extLst>
+          </p:cNvPr>
           <p:cNvSpPr>
             <a:spLocks noGrp="1"/>
           </p:cNvSpPr>
@@ -4635,45 +4880,10 @@
           </a:p>
         </p:txBody>
       </p:sp>
-      <p:sp>
-        <p:nvSpPr>
-          <p:cNvPr id="6" name="TextBox 5"/>
-          <p:cNvSpPr txBox="1"/>
-          <p:nvPr/>
-        </p:nvSpPr>
-        <p:spPr>
-          <a:xfrm>
-            <a:off x="4579143" y="1630838"/>
-            <a:ext cx="4400550" cy="2031325"/>
-          </a:xfrm>
-          <a:prstGeom prst="rect">
-            <a:avLst/>
-          </a:prstGeom>
-          <a:noFill/>
-          <a:ln w="57150">
-            <a:solidFill>
-              <a:srgbClr val="FF0000"/>
-            </a:solidFill>
-          </a:ln>
-        </p:spPr>
-        <p:txBody>
-          <a:bodyPr wrap="square" rtlCol="0">
-            <a:spAutoFit/>
-          </a:bodyPr>
-          <a:lstStyle/>
-          <a:p>
-            <a:pPr algn="just"/>
-            <a:r>
-              <a:rPr lang="en-IE" dirty="0"/>
-              <a:t>The items listed in this template are a suggestion of points to cover in your presentation. Some slide titles may fit your presentation; others may have to be replaced or deleted. You have to make this your own and reflect in the presentation your work during the final year project.</a:t>
-            </a:r>
-          </a:p>
-        </p:txBody>
-      </p:sp>
     </p:spTree>
     <p:extLst>
       <p:ext uri="{BB962C8B-B14F-4D97-AF65-F5344CB8AC3E}">
-        <p14:creationId xmlns:p14="http://schemas.microsoft.com/office/powerpoint/2010/main" val="3110083420"/>
+        <p14:creationId xmlns:p14="http://schemas.microsoft.com/office/powerpoint/2010/main" val="360620117"/>
       </p:ext>
     </p:extLst>
   </p:cSld>
@@ -4702,18 +4912,6 @@
       </p:grpSpPr>
       <p:sp>
         <p:nvSpPr>
-          <p:cNvPr id="13" name="Picture Placeholder 12"/>
-          <p:cNvSpPr>
-            <a:spLocks noGrp="1"/>
-          </p:cNvSpPr>
-          <p:nvPr>
-            <p:ph type="pic" sz="quarter" idx="12"/>
-          </p:nvPr>
-        </p:nvSpPr>
-        <p:spPr/>
-      </p:sp>
-      <p:sp>
-        <p:nvSpPr>
           <p:cNvPr id="2" name="Title 1"/>
           <p:cNvSpPr>
             <a:spLocks noGrp="1"/>
@@ -4729,7 +4927,7 @@
           <a:p>
             <a:r>
               <a:rPr lang="en-GB" dirty="0"/>
-              <a:t>Title</a:t>
+              <a:t>Conclusions</a:t>
             </a:r>
           </a:p>
         </p:txBody>
@@ -4751,13 +4949,28 @@
           <a:p>
             <a:r>
               <a:rPr lang="en-GB" dirty="0"/>
-              <a:t>Body text</a:t>
+              <a:t>Demonstrate Compliance</a:t>
             </a:r>
           </a:p>
           <a:p>
             <a:r>
               <a:rPr lang="en-GB" dirty="0"/>
-              <a:t>Body text</a:t>
+              <a:t>Introduction to GDPR</a:t>
+            </a:r>
+          </a:p>
+          <a:p>
+            <a:r>
+              <a:rPr lang="en-GB" dirty="0"/>
+              <a:t>Proof Of Concept</a:t>
+            </a:r>
+          </a:p>
+          <a:p>
+            <a:endParaRPr lang="en-GB" dirty="0"/>
+          </a:p>
+          <a:p>
+            <a:r>
+              <a:rPr lang="en-GB" dirty="0"/>
+              <a:t>Reflection</a:t>
             </a:r>
           </a:p>
         </p:txBody>
@@ -4777,10 +4990,7 @@
           <a:bodyPr/>
           <a:lstStyle/>
           <a:p>
-            <a:r>
-              <a:rPr lang="en-GB" dirty="0"/>
-              <a:t>Subtitle</a:t>
-            </a:r>
+            <a:endParaRPr lang="en-GB" dirty="0"/>
           </a:p>
         </p:txBody>
       </p:sp>
@@ -4791,7 +5001,7 @@
             <a:spLocks noGrp="1"/>
           </p:cNvSpPr>
           <p:nvPr>
-            <p:ph type="sldNum" sz="quarter" idx="13"/>
+            <p:ph type="sldNum" sz="quarter" idx="12"/>
           </p:nvPr>
         </p:nvSpPr>
         <p:spPr/>
@@ -4810,7 +5020,7 @@
     </p:spTree>
     <p:extLst>
       <p:ext uri="{BB962C8B-B14F-4D97-AF65-F5344CB8AC3E}">
-        <p14:creationId xmlns:p14="http://schemas.microsoft.com/office/powerpoint/2010/main" val="1859924847"/>
+        <p14:creationId xmlns:p14="http://schemas.microsoft.com/office/powerpoint/2010/main" val="1748537951"/>
       </p:ext>
     </p:extLst>
   </p:cSld>
@@ -4839,87 +5049,30 @@
       </p:grpSpPr>
       <p:sp>
         <p:nvSpPr>
-          <p:cNvPr id="2" name="Picture Placeholder 1"/>
-          <p:cNvSpPr>
-            <a:spLocks noGrp="1"/>
-          </p:cNvSpPr>
-          <p:nvPr>
-            <p:ph type="pic" sz="quarter" idx="12"/>
-          </p:nvPr>
-        </p:nvSpPr>
-        <p:spPr/>
-      </p:sp>
-      <p:sp>
-        <p:nvSpPr>
-          <p:cNvPr id="3" name="Title 2"/>
-          <p:cNvSpPr>
-            <a:spLocks noGrp="1"/>
-          </p:cNvSpPr>
-          <p:nvPr>
-            <p:ph type="title"/>
-          </p:nvPr>
-        </p:nvSpPr>
-        <p:spPr/>
-        <p:txBody>
-          <a:bodyPr/>
-          <a:lstStyle/>
-          <a:p>
-            <a:r>
-              <a:rPr lang="en-GB" dirty="0"/>
-              <a:t>Title</a:t>
-            </a:r>
-          </a:p>
-        </p:txBody>
-      </p:sp>
-      <p:sp>
-        <p:nvSpPr>
-          <p:cNvPr id="4" name="Text Placeholder 3"/>
-          <p:cNvSpPr>
-            <a:spLocks noGrp="1"/>
-          </p:cNvSpPr>
-          <p:nvPr>
-            <p:ph type="body" sz="quarter" idx="11"/>
-          </p:nvPr>
-        </p:nvSpPr>
-        <p:spPr/>
-        <p:txBody>
-          <a:bodyPr/>
-          <a:lstStyle/>
-          <a:p>
-            <a:r>
-              <a:rPr lang="en-GB" dirty="0"/>
-              <a:t>Subtitle</a:t>
-            </a:r>
-          </a:p>
-        </p:txBody>
-      </p:sp>
-      <p:sp>
-        <p:nvSpPr>
-          <p:cNvPr id="5" name="Slide Number Placeholder 4"/>
-          <p:cNvSpPr>
-            <a:spLocks noGrp="1"/>
-          </p:cNvSpPr>
-          <p:nvPr>
-            <p:ph type="sldNum" sz="quarter" idx="13"/>
-          </p:nvPr>
-        </p:nvSpPr>
-        <p:spPr/>
-        <p:txBody>
-          <a:bodyPr/>
-          <a:lstStyle/>
-          <a:p>
-            <a:fld id="{7D300DB9-A23F-43BD-B7EF-862D750C72E7}" type="slidenum">
-              <a:rPr lang="en-IE" smtClean="0"/>
-              <a:t>21</a:t>
-            </a:fld>
-            <a:endParaRPr lang="en-IE"/>
+          <p:cNvPr id="2" name="Title 1"/>
+          <p:cNvSpPr>
+            <a:spLocks noGrp="1"/>
+          </p:cNvSpPr>
+          <p:nvPr>
+            <p:ph type="ctrTitle"/>
+          </p:nvPr>
+        </p:nvSpPr>
+        <p:spPr/>
+        <p:txBody>
+          <a:bodyPr/>
+          <a:lstStyle/>
+          <a:p>
+            <a:r>
+              <a:rPr lang="en-GB"/>
+              <a:t>Thank You</a:t>
+            </a:r>
           </a:p>
         </p:txBody>
       </p:sp>
     </p:spTree>
     <p:extLst>
       <p:ext uri="{BB962C8B-B14F-4D97-AF65-F5344CB8AC3E}">
-        <p14:creationId xmlns:p14="http://schemas.microsoft.com/office/powerpoint/2010/main" val="2940529761"/>
+        <p14:creationId xmlns:p14="http://schemas.microsoft.com/office/powerpoint/2010/main" val="730746180"/>
       </p:ext>
     </p:extLst>
   </p:cSld>
@@ -4948,7 +5101,13 @@
       </p:grpSpPr>
       <p:sp>
         <p:nvSpPr>
-          <p:cNvPr id="16" name="Title 15"/>
+          <p:cNvPr id="2" name="Title 1">
+            <a:extLst>
+              <a:ext uri="{FF2B5EF4-FFF2-40B4-BE49-F238E27FC236}">
+                <a16:creationId xmlns:a16="http://schemas.microsoft.com/office/drawing/2014/main" id="{B510BBF9-A4D9-4D4B-B967-AB11390AC4C4}"/>
+              </a:ext>
+            </a:extLst>
+          </p:cNvPr>
           <p:cNvSpPr>
             <a:spLocks noGrp="1"/>
           </p:cNvSpPr>
@@ -4961,16 +5120,44 @@
           <a:bodyPr/>
           <a:lstStyle/>
           <a:p>
-            <a:r>
-              <a:rPr lang="en-GB" dirty="0"/>
-              <a:t>Title</a:t>
-            </a:r>
-          </a:p>
-        </p:txBody>
-      </p:sp>
-      <p:sp>
-        <p:nvSpPr>
-          <p:cNvPr id="3" name="Text Placeholder 2"/>
+            <a:endParaRPr lang="en-IE"/>
+          </a:p>
+        </p:txBody>
+      </p:sp>
+      <p:sp>
+        <p:nvSpPr>
+          <p:cNvPr id="3" name="Text Placeholder 2">
+            <a:extLst>
+              <a:ext uri="{FF2B5EF4-FFF2-40B4-BE49-F238E27FC236}">
+                <a16:creationId xmlns:a16="http://schemas.microsoft.com/office/drawing/2014/main" id="{82DCAB1E-2C90-4363-9B36-5494B6F4228D}"/>
+              </a:ext>
+            </a:extLst>
+          </p:cNvPr>
+          <p:cNvSpPr>
+            <a:spLocks noGrp="1"/>
+          </p:cNvSpPr>
+          <p:nvPr>
+            <p:ph type="body" sz="quarter" idx="10"/>
+          </p:nvPr>
+        </p:nvSpPr>
+        <p:spPr/>
+        <p:txBody>
+          <a:bodyPr/>
+          <a:lstStyle/>
+          <a:p>
+            <a:endParaRPr lang="en-IE"/>
+          </a:p>
+        </p:txBody>
+      </p:sp>
+      <p:sp>
+        <p:nvSpPr>
+          <p:cNvPr id="4" name="Text Placeholder 3">
+            <a:extLst>
+              <a:ext uri="{FF2B5EF4-FFF2-40B4-BE49-F238E27FC236}">
+                <a16:creationId xmlns:a16="http://schemas.microsoft.com/office/drawing/2014/main" id="{A3E30DD0-6CA2-4737-B1EC-44ADA379E755}"/>
+              </a:ext>
+            </a:extLst>
+          </p:cNvPr>
           <p:cNvSpPr>
             <a:spLocks noGrp="1"/>
           </p:cNvSpPr>
@@ -4983,52 +5170,19 @@
           <a:bodyPr/>
           <a:lstStyle/>
           <a:p>
-            <a:r>
-              <a:rPr lang="en-GB" dirty="0"/>
-              <a:t>Subtitle</a:t>
-            </a:r>
-          </a:p>
-        </p:txBody>
-      </p:sp>
-      <p:sp>
-        <p:nvSpPr>
-          <p:cNvPr id="17" name="Text Placeholder 16"/>
-          <p:cNvSpPr>
-            <a:spLocks noGrp="1"/>
-          </p:cNvSpPr>
-          <p:nvPr>
-            <p:ph type="body" sz="quarter" idx="10"/>
-          </p:nvPr>
-        </p:nvSpPr>
-        <p:spPr/>
-        <p:txBody>
-          <a:bodyPr/>
-          <a:lstStyle/>
-          <a:p>
-            <a:r>
-              <a:rPr lang="en-GB" dirty="0"/>
-              <a:t>Level 1</a:t>
-            </a:r>
-          </a:p>
-          <a:p>
-            <a:pPr lvl="1"/>
-            <a:r>
-              <a:rPr lang="en-GB" dirty="0"/>
-              <a:t>Level 2</a:t>
-            </a:r>
-          </a:p>
-          <a:p>
-            <a:pPr lvl="1"/>
-            <a:r>
-              <a:rPr lang="en-GB" dirty="0"/>
-              <a:t>Level 2</a:t>
-            </a:r>
-          </a:p>
-        </p:txBody>
-      </p:sp>
-      <p:sp>
-        <p:nvSpPr>
-          <p:cNvPr id="2" name="Slide Number Placeholder 1"/>
+            <a:endParaRPr lang="en-IE"/>
+          </a:p>
+        </p:txBody>
+      </p:sp>
+      <p:sp>
+        <p:nvSpPr>
+          <p:cNvPr id="5" name="Slide Number Placeholder 4">
+            <a:extLst>
+              <a:ext uri="{FF2B5EF4-FFF2-40B4-BE49-F238E27FC236}">
+                <a16:creationId xmlns:a16="http://schemas.microsoft.com/office/drawing/2014/main" id="{9D2A31BE-DBB3-4C11-A7C5-177A073FD411}"/>
+              </a:ext>
+            </a:extLst>
+          </p:cNvPr>
           <p:cNvSpPr>
             <a:spLocks noGrp="1"/>
           </p:cNvSpPr>
@@ -5052,7 +5206,7 @@
     </p:spTree>
     <p:extLst>
       <p:ext uri="{BB962C8B-B14F-4D97-AF65-F5344CB8AC3E}">
-        <p14:creationId xmlns:p14="http://schemas.microsoft.com/office/powerpoint/2010/main" val="894938792"/>
+        <p14:creationId xmlns:p14="http://schemas.microsoft.com/office/powerpoint/2010/main" val="577801632"/>
       </p:ext>
     </p:extLst>
   </p:cSld>
@@ -5081,13 +5235,7 @@
       </p:grpSpPr>
       <p:sp>
         <p:nvSpPr>
-          <p:cNvPr id="2" name="Title 1">
-            <a:extLst>
-              <a:ext uri="{FF2B5EF4-FFF2-40B4-BE49-F238E27FC236}">
-                <a16:creationId xmlns:a16="http://schemas.microsoft.com/office/drawing/2014/main" id="{CB36699C-98BB-4487-870B-1D3EC9D4B1FE}"/>
-              </a:ext>
-            </a:extLst>
-          </p:cNvPr>
+          <p:cNvPr id="2" name="Title 1"/>
           <p:cNvSpPr>
             <a:spLocks noGrp="1"/>
           </p:cNvSpPr>
@@ -5101,21 +5249,15 @@
           <a:lstStyle/>
           <a:p>
             <a:r>
-              <a:rPr lang="en-IE" dirty="0"/>
-              <a:t>Privacy Canvas – The Problem</a:t>
-            </a:r>
-          </a:p>
-        </p:txBody>
-      </p:sp>
-      <p:sp>
-        <p:nvSpPr>
-          <p:cNvPr id="3" name="Text Placeholder 2">
-            <a:extLst>
-              <a:ext uri="{FF2B5EF4-FFF2-40B4-BE49-F238E27FC236}">
-                <a16:creationId xmlns:a16="http://schemas.microsoft.com/office/drawing/2014/main" id="{719B2736-546A-44E5-AE4A-6AD254DEDABE}"/>
-              </a:ext>
-            </a:extLst>
-          </p:cNvPr>
+              <a:rPr lang="en-GB" dirty="0"/>
+              <a:t>Background &amp; Motivation</a:t>
+            </a:r>
+          </a:p>
+        </p:txBody>
+      </p:sp>
+      <p:sp>
+        <p:nvSpPr>
+          <p:cNvPr id="3" name="Text Placeholder 2"/>
           <p:cNvSpPr>
             <a:spLocks noGrp="1"/>
           </p:cNvSpPr>
@@ -5128,50 +5270,62 @@
           <a:bodyPr/>
           <a:lstStyle/>
           <a:p>
-            <a:r>
-              <a:rPr lang="en-IE" dirty="0"/>
-              <a:t>“This project will refactor or redesign the ethics canvas code to offer a canvas style interface for brainstorming the data protection issues in a digital application design, in a way suitable for supporting training in this topic in remote groups”</a:t>
-            </a:r>
-          </a:p>
-          <a:p>
-            <a:r>
-              <a:rPr lang="en-IE" dirty="0"/>
-              <a:t>Building on previous work(Peter, Ethics Canvas)</a:t>
-            </a:r>
-          </a:p>
-          <a:p>
-            <a:r>
-              <a:rPr lang="en-IE" dirty="0"/>
-              <a:t>My novel input (alongside </a:t>
-            </a:r>
-            <a:r>
-              <a:rPr lang="en-IE" dirty="0" err="1"/>
-              <a:t>bmc</a:t>
-            </a:r>
-            <a:r>
-              <a:rPr lang="en-IE" dirty="0"/>
-              <a:t>, intro to GDPR(intro May2018), </a:t>
-            </a:r>
-            <a:r>
-              <a:rPr lang="en-IE" dirty="0" err="1"/>
-              <a:t>PbD</a:t>
-            </a:r>
-            <a:r>
-              <a:rPr lang="en-IE" dirty="0"/>
-              <a:t>)</a:t>
-            </a:r>
-          </a:p>
-        </p:txBody>
-      </p:sp>
-      <p:sp>
-        <p:nvSpPr>
-          <p:cNvPr id="4" name="Text Placeholder 3">
-            <a:extLst>
-              <a:ext uri="{FF2B5EF4-FFF2-40B4-BE49-F238E27FC236}">
-                <a16:creationId xmlns:a16="http://schemas.microsoft.com/office/drawing/2014/main" id="{164BC214-CFA6-479A-A589-E51D08A86B7E}"/>
-              </a:ext>
-            </a:extLst>
-          </p:cNvPr>
+            <a:pPr>
+              <a:lnSpc>
+                <a:spcPct val="150000"/>
+              </a:lnSpc>
+            </a:pPr>
+            <a:r>
+              <a:rPr lang="en-GB" dirty="0"/>
+              <a:t>Business Model Canvas</a:t>
+            </a:r>
+          </a:p>
+          <a:p>
+            <a:pPr>
+              <a:lnSpc>
+                <a:spcPct val="150000"/>
+              </a:lnSpc>
+            </a:pPr>
+            <a:r>
+              <a:rPr lang="en-GB" dirty="0"/>
+              <a:t>Ethics Canvas</a:t>
+            </a:r>
+          </a:p>
+          <a:p>
+            <a:pPr>
+              <a:lnSpc>
+                <a:spcPct val="150000"/>
+              </a:lnSpc>
+            </a:pPr>
+            <a:r>
+              <a:rPr lang="en-GB" dirty="0"/>
+              <a:t>GDPR</a:t>
+            </a:r>
+          </a:p>
+          <a:p>
+            <a:pPr>
+              <a:lnSpc>
+                <a:spcPct val="150000"/>
+              </a:lnSpc>
+            </a:pPr>
+            <a:r>
+              <a:rPr lang="en-GB" dirty="0"/>
+              <a:t>Privacy By Design</a:t>
+            </a:r>
+          </a:p>
+          <a:p>
+            <a:pPr>
+              <a:lnSpc>
+                <a:spcPct val="150000"/>
+              </a:lnSpc>
+            </a:pPr>
+            <a:endParaRPr lang="en-GB" dirty="0"/>
+          </a:p>
+        </p:txBody>
+      </p:sp>
+      <p:sp>
+        <p:nvSpPr>
+          <p:cNvPr id="4" name="Text Placeholder 3"/>
           <p:cNvSpPr>
             <a:spLocks noGrp="1"/>
           </p:cNvSpPr>
@@ -5184,19 +5338,13 @@
           <a:bodyPr/>
           <a:lstStyle/>
           <a:p>
-            <a:endParaRPr lang="en-IE"/>
-          </a:p>
-        </p:txBody>
-      </p:sp>
-      <p:sp>
-        <p:nvSpPr>
-          <p:cNvPr id="5" name="Slide Number Placeholder 4">
-            <a:extLst>
-              <a:ext uri="{FF2B5EF4-FFF2-40B4-BE49-F238E27FC236}">
-                <a16:creationId xmlns:a16="http://schemas.microsoft.com/office/drawing/2014/main" id="{894077AE-03B4-4833-AF6E-D2C16F6247CD}"/>
-              </a:ext>
-            </a:extLst>
-          </p:cNvPr>
+            <a:endParaRPr lang="en-GB" dirty="0"/>
+          </a:p>
+        </p:txBody>
+      </p:sp>
+      <p:sp>
+        <p:nvSpPr>
+          <p:cNvPr id="5" name="Slide Number Placeholder 4"/>
           <p:cNvSpPr>
             <a:spLocks noGrp="1"/>
           </p:cNvSpPr>
@@ -5220,7 +5368,7 @@
     </p:spTree>
     <p:extLst>
       <p:ext uri="{BB962C8B-B14F-4D97-AF65-F5344CB8AC3E}">
-        <p14:creationId xmlns:p14="http://schemas.microsoft.com/office/powerpoint/2010/main" val="360620117"/>
+        <p14:creationId xmlns:p14="http://schemas.microsoft.com/office/powerpoint/2010/main" val="1341295446"/>
       </p:ext>
     </p:extLst>
   </p:cSld>
@@ -5249,7 +5397,13 @@
       </p:grpSpPr>
       <p:sp>
         <p:nvSpPr>
-          <p:cNvPr id="2" name="Title 1"/>
+          <p:cNvPr id="23" name="Title 22">
+            <a:extLst>
+              <a:ext uri="{FF2B5EF4-FFF2-40B4-BE49-F238E27FC236}">
+                <a16:creationId xmlns:a16="http://schemas.microsoft.com/office/drawing/2014/main" id="{3ABF63D3-7F5B-43A8-92EF-1F4055D73EF4}"/>
+              </a:ext>
+            </a:extLst>
+          </p:cNvPr>
           <p:cNvSpPr>
             <a:spLocks noGrp="1"/>
           </p:cNvSpPr>
@@ -5263,15 +5417,21 @@
           <a:lstStyle/>
           <a:p>
             <a:r>
-              <a:rPr lang="en-GB" dirty="0"/>
-              <a:t>Background &amp; Motivation</a:t>
-            </a:r>
-          </a:p>
-        </p:txBody>
-      </p:sp>
-      <p:sp>
-        <p:nvSpPr>
-          <p:cNvPr id="3" name="Text Placeholder 2"/>
+              <a:rPr lang="en-IE" dirty="0"/>
+              <a:t>The Business Model Canvas</a:t>
+            </a:r>
+          </a:p>
+        </p:txBody>
+      </p:sp>
+      <p:sp>
+        <p:nvSpPr>
+          <p:cNvPr id="24" name="Text Placeholder 23">
+            <a:extLst>
+              <a:ext uri="{FF2B5EF4-FFF2-40B4-BE49-F238E27FC236}">
+                <a16:creationId xmlns:a16="http://schemas.microsoft.com/office/drawing/2014/main" id="{9803F4CD-56CE-4E9B-9B2D-E49B1819DC48}"/>
+              </a:ext>
+            </a:extLst>
+          </p:cNvPr>
           <p:cNvSpPr>
             <a:spLocks noGrp="1"/>
           </p:cNvSpPr>
@@ -5284,62 +5444,19 @@
           <a:bodyPr/>
           <a:lstStyle/>
           <a:p>
-            <a:pPr>
-              <a:lnSpc>
-                <a:spcPct val="150000"/>
-              </a:lnSpc>
-            </a:pPr>
-            <a:r>
-              <a:rPr lang="en-GB" dirty="0"/>
-              <a:t>Business Model Canvas</a:t>
-            </a:r>
-          </a:p>
-          <a:p>
-            <a:pPr>
-              <a:lnSpc>
-                <a:spcPct val="150000"/>
-              </a:lnSpc>
-            </a:pPr>
-            <a:r>
-              <a:rPr lang="en-GB" dirty="0"/>
-              <a:t>Ethics Canvas</a:t>
-            </a:r>
-          </a:p>
-          <a:p>
-            <a:pPr>
-              <a:lnSpc>
-                <a:spcPct val="150000"/>
-              </a:lnSpc>
-            </a:pPr>
-            <a:r>
-              <a:rPr lang="en-GB" dirty="0"/>
-              <a:t>GDPR</a:t>
-            </a:r>
-          </a:p>
-          <a:p>
-            <a:pPr>
-              <a:lnSpc>
-                <a:spcPct val="150000"/>
-              </a:lnSpc>
-            </a:pPr>
-            <a:r>
-              <a:rPr lang="en-GB" dirty="0"/>
-              <a:t>Privacy By Design</a:t>
-            </a:r>
-          </a:p>
-          <a:p>
-            <a:pPr>
-              <a:lnSpc>
-                <a:spcPct val="150000"/>
-              </a:lnSpc>
-            </a:pPr>
-            <a:endParaRPr lang="en-GB" dirty="0"/>
-          </a:p>
-        </p:txBody>
-      </p:sp>
-      <p:sp>
-        <p:nvSpPr>
-          <p:cNvPr id="4" name="Text Placeholder 3"/>
+            <a:endParaRPr lang="en-IE" dirty="0"/>
+          </a:p>
+        </p:txBody>
+      </p:sp>
+      <p:sp>
+        <p:nvSpPr>
+          <p:cNvPr id="25" name="Text Placeholder 24">
+            <a:extLst>
+              <a:ext uri="{FF2B5EF4-FFF2-40B4-BE49-F238E27FC236}">
+                <a16:creationId xmlns:a16="http://schemas.microsoft.com/office/drawing/2014/main" id="{29546365-1D5A-4ABB-895B-7BD0EE08BF59}"/>
+              </a:ext>
+            </a:extLst>
+          </p:cNvPr>
           <p:cNvSpPr>
             <a:spLocks noGrp="1"/>
           </p:cNvSpPr>
@@ -5352,13 +5469,19 @@
           <a:bodyPr/>
           <a:lstStyle/>
           <a:p>
-            <a:endParaRPr lang="en-GB" dirty="0"/>
-          </a:p>
-        </p:txBody>
-      </p:sp>
-      <p:sp>
-        <p:nvSpPr>
-          <p:cNvPr id="5" name="Slide Number Placeholder 4"/>
+            <a:endParaRPr lang="en-IE"/>
+          </a:p>
+        </p:txBody>
+      </p:sp>
+      <p:sp>
+        <p:nvSpPr>
+          <p:cNvPr id="5" name="Slide Number Placeholder 4">
+            <a:extLst>
+              <a:ext uri="{FF2B5EF4-FFF2-40B4-BE49-F238E27FC236}">
+                <a16:creationId xmlns:a16="http://schemas.microsoft.com/office/drawing/2014/main" id="{A84160DC-F1B4-4104-AACC-4720F2B19831}"/>
+              </a:ext>
+            </a:extLst>
+          </p:cNvPr>
           <p:cNvSpPr>
             <a:spLocks noGrp="1"/>
           </p:cNvSpPr>
@@ -5374,143 +5497,6 @@
             <a:fld id="{7D300DB9-A23F-43BD-B7EF-862D750C72E7}" type="slidenum">
               <a:rPr lang="en-IE" smtClean="0"/>
               <a:t>4</a:t>
-            </a:fld>
-            <a:endParaRPr lang="en-IE"/>
-          </a:p>
-        </p:txBody>
-      </p:sp>
-    </p:spTree>
-    <p:extLst>
-      <p:ext uri="{BB962C8B-B14F-4D97-AF65-F5344CB8AC3E}">
-        <p14:creationId xmlns:p14="http://schemas.microsoft.com/office/powerpoint/2010/main" val="1341295446"/>
-      </p:ext>
-    </p:extLst>
-  </p:cSld>
-  <p:clrMapOvr>
-    <a:masterClrMapping/>
-  </p:clrMapOvr>
-</p:sld>
-</file>
-
-<file path=ppt/slides/slide5.xml><?xml version="1.0" encoding="utf-8"?>
-<p:sld xmlns:a="http://schemas.openxmlformats.org/drawingml/2006/main" xmlns:r="http://schemas.openxmlformats.org/officeDocument/2006/relationships" xmlns:p="http://schemas.openxmlformats.org/presentationml/2006/main">
-  <p:cSld>
-    <p:spTree>
-      <p:nvGrpSpPr>
-        <p:cNvPr id="1" name=""/>
-        <p:cNvGrpSpPr/>
-        <p:nvPr/>
-      </p:nvGrpSpPr>
-      <p:grpSpPr>
-        <a:xfrm>
-          <a:off x="0" y="0"/>
-          <a:ext cx="0" cy="0"/>
-          <a:chOff x="0" y="0"/>
-          <a:chExt cx="0" cy="0"/>
-        </a:xfrm>
-      </p:grpSpPr>
-      <p:sp>
-        <p:nvSpPr>
-          <p:cNvPr id="23" name="Title 22">
-            <a:extLst>
-              <a:ext uri="{FF2B5EF4-FFF2-40B4-BE49-F238E27FC236}">
-                <a16:creationId xmlns:a16="http://schemas.microsoft.com/office/drawing/2014/main" id="{3ABF63D3-7F5B-43A8-92EF-1F4055D73EF4}"/>
-              </a:ext>
-            </a:extLst>
-          </p:cNvPr>
-          <p:cNvSpPr>
-            <a:spLocks noGrp="1"/>
-          </p:cNvSpPr>
-          <p:nvPr>
-            <p:ph type="title"/>
-          </p:nvPr>
-        </p:nvSpPr>
-        <p:spPr/>
-        <p:txBody>
-          <a:bodyPr/>
-          <a:lstStyle/>
-          <a:p>
-            <a:r>
-              <a:rPr lang="en-IE" dirty="0"/>
-              <a:t>The Business Model Canvas</a:t>
-            </a:r>
-          </a:p>
-        </p:txBody>
-      </p:sp>
-      <p:sp>
-        <p:nvSpPr>
-          <p:cNvPr id="24" name="Text Placeholder 23">
-            <a:extLst>
-              <a:ext uri="{FF2B5EF4-FFF2-40B4-BE49-F238E27FC236}">
-                <a16:creationId xmlns:a16="http://schemas.microsoft.com/office/drawing/2014/main" id="{9803F4CD-56CE-4E9B-9B2D-E49B1819DC48}"/>
-              </a:ext>
-            </a:extLst>
-          </p:cNvPr>
-          <p:cNvSpPr>
-            <a:spLocks noGrp="1"/>
-          </p:cNvSpPr>
-          <p:nvPr>
-            <p:ph type="body" sz="quarter" idx="10"/>
-          </p:nvPr>
-        </p:nvSpPr>
-        <p:spPr/>
-        <p:txBody>
-          <a:bodyPr/>
-          <a:lstStyle/>
-          <a:p>
-            <a:endParaRPr lang="en-IE" dirty="0"/>
-          </a:p>
-        </p:txBody>
-      </p:sp>
-      <p:sp>
-        <p:nvSpPr>
-          <p:cNvPr id="25" name="Text Placeholder 24">
-            <a:extLst>
-              <a:ext uri="{FF2B5EF4-FFF2-40B4-BE49-F238E27FC236}">
-                <a16:creationId xmlns:a16="http://schemas.microsoft.com/office/drawing/2014/main" id="{29546365-1D5A-4ABB-895B-7BD0EE08BF59}"/>
-              </a:ext>
-            </a:extLst>
-          </p:cNvPr>
-          <p:cNvSpPr>
-            <a:spLocks noGrp="1"/>
-          </p:cNvSpPr>
-          <p:nvPr>
-            <p:ph type="body" sz="quarter" idx="11"/>
-          </p:nvPr>
-        </p:nvSpPr>
-        <p:spPr/>
-        <p:txBody>
-          <a:bodyPr/>
-          <a:lstStyle/>
-          <a:p>
-            <a:endParaRPr lang="en-IE"/>
-          </a:p>
-        </p:txBody>
-      </p:sp>
-      <p:sp>
-        <p:nvSpPr>
-          <p:cNvPr id="5" name="Slide Number Placeholder 4">
-            <a:extLst>
-              <a:ext uri="{FF2B5EF4-FFF2-40B4-BE49-F238E27FC236}">
-                <a16:creationId xmlns:a16="http://schemas.microsoft.com/office/drawing/2014/main" id="{A84160DC-F1B4-4104-AACC-4720F2B19831}"/>
-              </a:ext>
-            </a:extLst>
-          </p:cNvPr>
-          <p:cNvSpPr>
-            <a:spLocks noGrp="1"/>
-          </p:cNvSpPr>
-          <p:nvPr>
-            <p:ph type="sldNum" sz="quarter" idx="12"/>
-          </p:nvPr>
-        </p:nvSpPr>
-        <p:spPr/>
-        <p:txBody>
-          <a:bodyPr/>
-          <a:lstStyle/>
-          <a:p>
-            <a:fld id="{7D300DB9-A23F-43BD-B7EF-862D750C72E7}" type="slidenum">
-              <a:rPr lang="en-IE" smtClean="0"/>
-              <a:t>5</a:t>
             </a:fld>
             <a:endParaRPr lang="en-IE"/>
           </a:p>
@@ -5564,6 +5550,195 @@
 </p:sld>
 </file>
 
+<file path=ppt/slides/slide5.xml><?xml version="1.0" encoding="utf-8"?>
+<p:sld xmlns:a="http://schemas.openxmlformats.org/drawingml/2006/main" xmlns:r="http://schemas.openxmlformats.org/officeDocument/2006/relationships" xmlns:p="http://schemas.openxmlformats.org/presentationml/2006/main">
+  <p:cSld>
+    <p:spTree>
+      <p:nvGrpSpPr>
+        <p:cNvPr id="1" name=""/>
+        <p:cNvGrpSpPr/>
+        <p:nvPr/>
+      </p:nvGrpSpPr>
+      <p:grpSpPr>
+        <a:xfrm>
+          <a:off x="0" y="0"/>
+          <a:ext cx="0" cy="0"/>
+          <a:chOff x="0" y="0"/>
+          <a:chExt cx="0" cy="0"/>
+        </a:xfrm>
+      </p:grpSpPr>
+      <p:sp>
+        <p:nvSpPr>
+          <p:cNvPr id="2" name="Title 1">
+            <a:extLst>
+              <a:ext uri="{FF2B5EF4-FFF2-40B4-BE49-F238E27FC236}">
+                <a16:creationId xmlns:a16="http://schemas.microsoft.com/office/drawing/2014/main" id="{47B5E2AB-5459-4F98-9C3C-F32D49014272}"/>
+              </a:ext>
+            </a:extLst>
+          </p:cNvPr>
+          <p:cNvSpPr>
+            <a:spLocks noGrp="1"/>
+          </p:cNvSpPr>
+          <p:nvPr>
+            <p:ph type="title"/>
+          </p:nvPr>
+        </p:nvSpPr>
+        <p:spPr/>
+        <p:txBody>
+          <a:bodyPr/>
+          <a:lstStyle/>
+          <a:p>
+            <a:r>
+              <a:rPr lang="en-IE" dirty="0"/>
+              <a:t>My Project</a:t>
+            </a:r>
+          </a:p>
+        </p:txBody>
+      </p:sp>
+      <p:sp>
+        <p:nvSpPr>
+          <p:cNvPr id="3" name="Text Placeholder 2">
+            <a:extLst>
+              <a:ext uri="{FF2B5EF4-FFF2-40B4-BE49-F238E27FC236}">
+                <a16:creationId xmlns:a16="http://schemas.microsoft.com/office/drawing/2014/main" id="{35496644-ED68-46FE-99AC-94C6FF72887C}"/>
+              </a:ext>
+            </a:extLst>
+          </p:cNvPr>
+          <p:cNvSpPr>
+            <a:spLocks noGrp="1"/>
+          </p:cNvSpPr>
+          <p:nvPr>
+            <p:ph type="body" sz="quarter" idx="10"/>
+          </p:nvPr>
+        </p:nvSpPr>
+        <p:spPr/>
+        <p:txBody>
+          <a:bodyPr/>
+          <a:lstStyle/>
+          <a:p>
+            <a:r>
+              <a:rPr lang="en-IE" dirty="0"/>
+              <a:t>Use Alongside The Business Model Canvas</a:t>
+            </a:r>
+          </a:p>
+          <a:p>
+            <a:r>
+              <a:rPr lang="en-IE" dirty="0"/>
+              <a:t>Introduction To GDPR</a:t>
+            </a:r>
+          </a:p>
+          <a:p>
+            <a:r>
+              <a:rPr lang="en-IE" dirty="0"/>
+              <a:t>Privacy By Design</a:t>
+            </a:r>
+          </a:p>
+          <a:p>
+            <a:r>
+              <a:rPr lang="en-IE" dirty="0"/>
+              <a:t>Digital Implementation</a:t>
+            </a:r>
+          </a:p>
+          <a:p>
+            <a:endParaRPr lang="en-IE" dirty="0"/>
+          </a:p>
+          <a:p>
+            <a:endParaRPr lang="en-IE" dirty="0"/>
+          </a:p>
+          <a:p>
+            <a:r>
+              <a:rPr lang="en-IE" dirty="0"/>
+              <a:t>My novel input (alongside </a:t>
+            </a:r>
+            <a:r>
+              <a:rPr lang="en-IE" dirty="0" err="1"/>
+              <a:t>bmc</a:t>
+            </a:r>
+            <a:r>
+              <a:rPr lang="en-IE" dirty="0"/>
+              <a:t>, intro to GDPR(intro May2018), </a:t>
+            </a:r>
+            <a:r>
+              <a:rPr lang="en-IE" dirty="0" err="1"/>
+              <a:t>PbD</a:t>
+            </a:r>
+            <a:r>
+              <a:rPr lang="en-IE" dirty="0"/>
+              <a:t>)</a:t>
+            </a:r>
+          </a:p>
+          <a:p>
+            <a:endParaRPr lang="en-IE" dirty="0"/>
+          </a:p>
+        </p:txBody>
+      </p:sp>
+      <p:sp>
+        <p:nvSpPr>
+          <p:cNvPr id="4" name="Text Placeholder 3">
+            <a:extLst>
+              <a:ext uri="{FF2B5EF4-FFF2-40B4-BE49-F238E27FC236}">
+                <a16:creationId xmlns:a16="http://schemas.microsoft.com/office/drawing/2014/main" id="{40CEC28A-5C73-4ED8-924C-40A4FFBC39B9}"/>
+              </a:ext>
+            </a:extLst>
+          </p:cNvPr>
+          <p:cNvSpPr>
+            <a:spLocks noGrp="1"/>
+          </p:cNvSpPr>
+          <p:nvPr>
+            <p:ph type="body" sz="quarter" idx="11"/>
+          </p:nvPr>
+        </p:nvSpPr>
+        <p:spPr/>
+        <p:txBody>
+          <a:bodyPr/>
+          <a:lstStyle/>
+          <a:p>
+            <a:endParaRPr lang="en-IE"/>
+          </a:p>
+        </p:txBody>
+      </p:sp>
+      <p:sp>
+        <p:nvSpPr>
+          <p:cNvPr id="5" name="Slide Number Placeholder 4">
+            <a:extLst>
+              <a:ext uri="{FF2B5EF4-FFF2-40B4-BE49-F238E27FC236}">
+                <a16:creationId xmlns:a16="http://schemas.microsoft.com/office/drawing/2014/main" id="{0CE74FDB-822C-408F-B55A-93F29DFEDC00}"/>
+              </a:ext>
+            </a:extLst>
+          </p:cNvPr>
+          <p:cNvSpPr>
+            <a:spLocks noGrp="1"/>
+          </p:cNvSpPr>
+          <p:nvPr>
+            <p:ph type="sldNum" sz="quarter" idx="12"/>
+          </p:nvPr>
+        </p:nvSpPr>
+        <p:spPr/>
+        <p:txBody>
+          <a:bodyPr/>
+          <a:lstStyle/>
+          <a:p>
+            <a:fld id="{7D300DB9-A23F-43BD-B7EF-862D750C72E7}" type="slidenum">
+              <a:rPr lang="en-IE" smtClean="0"/>
+              <a:t>5</a:t>
+            </a:fld>
+            <a:endParaRPr lang="en-IE"/>
+          </a:p>
+        </p:txBody>
+      </p:sp>
+    </p:spTree>
+    <p:extLst>
+      <p:ext uri="{BB962C8B-B14F-4D97-AF65-F5344CB8AC3E}">
+        <p14:creationId xmlns:p14="http://schemas.microsoft.com/office/powerpoint/2010/main" val="1878624785"/>
+      </p:ext>
+    </p:extLst>
+  </p:cSld>
+  <p:clrMapOvr>
+    <a:masterClrMapping/>
+  </p:clrMapOvr>
+</p:sld>
+</file>
+
 <file path=ppt/slides/slide6.xml><?xml version="1.0" encoding="utf-8"?>
 <p:sld xmlns:a="http://schemas.openxmlformats.org/drawingml/2006/main" xmlns:r="http://schemas.openxmlformats.org/officeDocument/2006/relationships" xmlns:p="http://schemas.openxmlformats.org/presentationml/2006/main">
   <p:cSld>
@@ -5583,13 +5758,7 @@
       </p:grpSpPr>
       <p:sp>
         <p:nvSpPr>
-          <p:cNvPr id="2" name="Title 1">
-            <a:extLst>
-              <a:ext uri="{FF2B5EF4-FFF2-40B4-BE49-F238E27FC236}">
-                <a16:creationId xmlns:a16="http://schemas.microsoft.com/office/drawing/2014/main" id="{47B5E2AB-5459-4F98-9C3C-F32D49014272}"/>
-              </a:ext>
-            </a:extLst>
-          </p:cNvPr>
+          <p:cNvPr id="2" name="Title 1"/>
           <p:cNvSpPr>
             <a:spLocks noGrp="1"/>
           </p:cNvSpPr>
@@ -5603,98 +5772,80 @@
           <a:lstStyle/>
           <a:p>
             <a:r>
+              <a:rPr lang="en-GB" dirty="0"/>
+              <a:t>Design</a:t>
+            </a:r>
+          </a:p>
+        </p:txBody>
+      </p:sp>
+      <p:sp>
+        <p:nvSpPr>
+          <p:cNvPr id="3" name="Text Placeholder 2"/>
+          <p:cNvSpPr>
+            <a:spLocks noGrp="1"/>
+          </p:cNvSpPr>
+          <p:nvPr>
+            <p:ph type="body" sz="quarter" idx="10"/>
+          </p:nvPr>
+        </p:nvSpPr>
+        <p:spPr/>
+        <p:txBody>
+          <a:bodyPr/>
+          <a:lstStyle/>
+          <a:p>
+            <a:r>
               <a:rPr lang="en-IE" dirty="0"/>
-              <a:t>My Project</a:t>
-            </a:r>
-          </a:p>
-        </p:txBody>
-      </p:sp>
-      <p:sp>
-        <p:nvSpPr>
-          <p:cNvPr id="3" name="Text Placeholder 2">
-            <a:extLst>
-              <a:ext uri="{FF2B5EF4-FFF2-40B4-BE49-F238E27FC236}">
-                <a16:creationId xmlns:a16="http://schemas.microsoft.com/office/drawing/2014/main" id="{35496644-ED68-46FE-99AC-94C6FF72887C}"/>
-              </a:ext>
-            </a:extLst>
-          </p:cNvPr>
-          <p:cNvSpPr>
-            <a:spLocks noGrp="1"/>
-          </p:cNvSpPr>
-          <p:nvPr>
-            <p:ph type="body" sz="quarter" idx="10"/>
-          </p:nvPr>
-        </p:nvSpPr>
-        <p:spPr/>
-        <p:txBody>
-          <a:bodyPr/>
-          <a:lstStyle/>
-          <a:p>
+              <a:t>Divided into sub-blocks which each hold a particular purpose(motivation ethics canvas)</a:t>
+            </a:r>
+          </a:p>
+          <a:p>
+            <a:r>
+              <a:rPr lang="en-IE" b="1" dirty="0"/>
+              <a:t>Blocks 1-3:</a:t>
+            </a:r>
             <a:r>
               <a:rPr lang="en-IE" dirty="0"/>
-              <a:t>Use Alongside The Business Model Canvas</a:t>
-            </a:r>
-          </a:p>
-          <a:p>
+              <a:t> Data subjects and Data type</a:t>
+            </a:r>
+          </a:p>
+          <a:p>
+            <a:r>
+              <a:rPr lang="en-IE" b="1" dirty="0"/>
+              <a:t>Blocks 4-6:</a:t>
+            </a:r>
             <a:r>
               <a:rPr lang="en-IE" dirty="0"/>
-              <a:t>Introduction To GDPR</a:t>
-            </a:r>
-          </a:p>
-          <a:p>
+              <a:t> Interaction with Data subjects</a:t>
+            </a:r>
+          </a:p>
+          <a:p>
+            <a:r>
+              <a:rPr lang="en-IE" b="1" dirty="0"/>
+              <a:t>Blocks 7-8:</a:t>
+            </a:r>
             <a:r>
               <a:rPr lang="en-IE" dirty="0"/>
-              <a:t>Privacy By Design</a:t>
-            </a:r>
-          </a:p>
-          <a:p>
+              <a:t> Privacy and Data protection</a:t>
+            </a:r>
+          </a:p>
+          <a:p>
+            <a:r>
+              <a:rPr lang="en-IE" b="1" dirty="0"/>
+              <a:t>Block 9:</a:t>
+            </a:r>
             <a:r>
               <a:rPr lang="en-IE" dirty="0"/>
-              <a:t>Digital Implementation</a:t>
-            </a:r>
-          </a:p>
-          <a:p>
-            <a:endParaRPr lang="en-IE" dirty="0"/>
-          </a:p>
-          <a:p>
-            <a:endParaRPr lang="en-IE" dirty="0"/>
-          </a:p>
-          <a:p>
-            <a:r>
-              <a:rPr lang="en-IE" dirty="0"/>
-              <a:t>My novel input (alongside </a:t>
-            </a:r>
-            <a:r>
-              <a:rPr lang="en-IE" dirty="0" err="1"/>
-              <a:t>bmc</a:t>
-            </a:r>
-            <a:r>
-              <a:rPr lang="en-IE" dirty="0"/>
-              <a:t>, intro to GDPR(intro May2018), </a:t>
-            </a:r>
-            <a:r>
-              <a:rPr lang="en-IE" dirty="0" err="1"/>
-              <a:t>PbD</a:t>
-            </a:r>
-            <a:r>
-              <a:rPr lang="en-IE" dirty="0"/>
-              <a:t>)</a:t>
-            </a:r>
-          </a:p>
-          <a:p>
-            <a:endParaRPr lang="en-IE" dirty="0"/>
-          </a:p>
-        </p:txBody>
-      </p:sp>
-      <p:sp>
-        <p:nvSpPr>
-          <p:cNvPr id="4" name="Text Placeholder 3">
-            <a:extLst>
-              <a:ext uri="{FF2B5EF4-FFF2-40B4-BE49-F238E27FC236}">
-                <a16:creationId xmlns:a16="http://schemas.microsoft.com/office/drawing/2014/main" id="{40CEC28A-5C73-4ED8-924C-40A4FFBC39B9}"/>
-              </a:ext>
-            </a:extLst>
-          </p:cNvPr>
+              <a:t> Data breach(overcome ethical imp)</a:t>
+            </a:r>
+          </a:p>
+          <a:p>
+            <a:endParaRPr lang="en-GB" dirty="0"/>
+          </a:p>
+        </p:txBody>
+      </p:sp>
+      <p:sp>
+        <p:nvSpPr>
+          <p:cNvPr id="4" name="Text Placeholder 3"/>
           <p:cNvSpPr>
             <a:spLocks noGrp="1"/>
           </p:cNvSpPr>
@@ -5707,19 +5858,16 @@
           <a:bodyPr/>
           <a:lstStyle/>
           <a:p>
-            <a:endParaRPr lang="en-IE"/>
-          </a:p>
-        </p:txBody>
-      </p:sp>
-      <p:sp>
-        <p:nvSpPr>
-          <p:cNvPr id="5" name="Slide Number Placeholder 4">
-            <a:extLst>
-              <a:ext uri="{FF2B5EF4-FFF2-40B4-BE49-F238E27FC236}">
-                <a16:creationId xmlns:a16="http://schemas.microsoft.com/office/drawing/2014/main" id="{0CE74FDB-822C-408F-B55A-93F29DFEDC00}"/>
-              </a:ext>
-            </a:extLst>
-          </p:cNvPr>
+            <a:r>
+              <a:rPr lang="en-GB" dirty="0"/>
+              <a:t>My Privacy Canvas </a:t>
+            </a:r>
+          </a:p>
+        </p:txBody>
+      </p:sp>
+      <p:sp>
+        <p:nvSpPr>
+          <p:cNvPr id="5" name="Slide Number Placeholder 4"/>
           <p:cNvSpPr>
             <a:spLocks noGrp="1"/>
           </p:cNvSpPr>
@@ -5743,7 +5891,7 @@
     </p:spTree>
     <p:extLst>
       <p:ext uri="{BB962C8B-B14F-4D97-AF65-F5344CB8AC3E}">
-        <p14:creationId xmlns:p14="http://schemas.microsoft.com/office/powerpoint/2010/main" val="1878624785"/>
+        <p14:creationId xmlns:p14="http://schemas.microsoft.com/office/powerpoint/2010/main" val="1159338131"/>
       </p:ext>
     </p:extLst>
   </p:cSld>
@@ -5772,7 +5920,13 @@
       </p:grpSpPr>
       <p:sp>
         <p:nvSpPr>
-          <p:cNvPr id="2" name="Title 1"/>
+          <p:cNvPr id="2" name="Title 1">
+            <a:extLst>
+              <a:ext uri="{FF2B5EF4-FFF2-40B4-BE49-F238E27FC236}">
+                <a16:creationId xmlns:a16="http://schemas.microsoft.com/office/drawing/2014/main" id="{0A4B7CEF-1A10-4AEB-AF36-271FCF3E2668}"/>
+              </a:ext>
+            </a:extLst>
+          </p:cNvPr>
           <p:cNvSpPr>
             <a:spLocks noGrp="1"/>
           </p:cNvSpPr>
@@ -5786,7 +5940,7 @@
           <a:lstStyle/>
           <a:p>
             <a:r>
-              <a:rPr lang="en-GB" dirty="0"/>
+              <a:rPr lang="en-IE" dirty="0"/>
               <a:t>Design</a:t>
             </a:r>
           </a:p>
@@ -5794,7 +5948,13 @@
       </p:sp>
       <p:sp>
         <p:nvSpPr>
-          <p:cNvPr id="3" name="Text Placeholder 2"/>
+          <p:cNvPr id="3" name="Text Placeholder 2">
+            <a:extLst>
+              <a:ext uri="{FF2B5EF4-FFF2-40B4-BE49-F238E27FC236}">
+                <a16:creationId xmlns:a16="http://schemas.microsoft.com/office/drawing/2014/main" id="{8BF928D7-D59F-45AA-B126-C21112F51DD1}"/>
+              </a:ext>
+            </a:extLst>
+          </p:cNvPr>
           <p:cNvSpPr>
             <a:spLocks noGrp="1"/>
           </p:cNvSpPr>
@@ -5807,81 +5967,91 @@
           <a:bodyPr/>
           <a:lstStyle/>
           <a:p>
+            <a:pPr marL="0" indent="0">
+              <a:buNone/>
+            </a:pPr>
+            <a:r>
+              <a:rPr lang="en-IE" b="1" u="sng" dirty="0"/>
+              <a:t>1. Data Group(s)</a:t>
+            </a:r>
+            <a:endParaRPr lang="en-IE" dirty="0"/>
+          </a:p>
+          <a:p>
+            <a:pPr marL="0" indent="0">
+              <a:buNone/>
+            </a:pPr>
             <a:r>
               <a:rPr lang="en-IE" dirty="0"/>
-              <a:t>Divided into sub-blocks which each hold a particular purpose(motivation ethics canvas)</a:t>
-            </a:r>
-          </a:p>
-          <a:p>
-            <a:r>
-              <a:rPr lang="en-IE" b="1" dirty="0"/>
-              <a:t>Blocks 1-3:</a:t>
-            </a:r>
+              <a:t>What type of people do you hold personal data on? Employees/Customers/Adults/Children etc?</a:t>
+            </a:r>
+          </a:p>
+          <a:p>
+            <a:pPr marL="0" indent="0">
+              <a:buNone/>
+            </a:pPr>
+            <a:endParaRPr lang="en-IE" b="1" u="sng" dirty="0"/>
+          </a:p>
+          <a:p>
+            <a:pPr marL="0" indent="0">
+              <a:buNone/>
+            </a:pPr>
+            <a:r>
+              <a:rPr lang="en-IE" b="1" u="sng" dirty="0"/>
+              <a:t>2. Data Type</a:t>
+            </a:r>
+            <a:endParaRPr lang="en-IE" dirty="0"/>
+          </a:p>
+          <a:p>
+            <a:pPr marL="0" indent="0">
+              <a:buNone/>
+            </a:pPr>
             <a:r>
               <a:rPr lang="en-IE" dirty="0"/>
-              <a:t> Data subjects and Data type</a:t>
-            </a:r>
-          </a:p>
-          <a:p>
-            <a:r>
-              <a:rPr lang="en-IE" b="1" dirty="0"/>
-              <a:t>Blocks 4-6:</a:t>
-            </a:r>
+              <a:t>What type of data do you hold? Children data? Sensitive data? Biometric data(data that could identify a person)?</a:t>
+            </a:r>
+          </a:p>
+          <a:p>
+            <a:endParaRPr lang="en-IE" dirty="0"/>
+          </a:p>
+        </p:txBody>
+      </p:sp>
+      <p:sp>
+        <p:nvSpPr>
+          <p:cNvPr id="4" name="Text Placeholder 3">
+            <a:extLst>
+              <a:ext uri="{FF2B5EF4-FFF2-40B4-BE49-F238E27FC236}">
+                <a16:creationId xmlns:a16="http://schemas.microsoft.com/office/drawing/2014/main" id="{C736D03D-0E3A-4D0D-A7C7-1F42D69A0E96}"/>
+              </a:ext>
+            </a:extLst>
+          </p:cNvPr>
+          <p:cNvSpPr>
+            <a:spLocks noGrp="1"/>
+          </p:cNvSpPr>
+          <p:nvPr>
+            <p:ph type="body" sz="quarter" idx="11"/>
+          </p:nvPr>
+        </p:nvSpPr>
+        <p:spPr/>
+        <p:txBody>
+          <a:bodyPr/>
+          <a:lstStyle/>
+          <a:p>
             <a:r>
               <a:rPr lang="en-IE" dirty="0"/>
-              <a:t> Interaction with Data subjects</a:t>
-            </a:r>
-          </a:p>
-          <a:p>
-            <a:r>
-              <a:rPr lang="en-IE" b="1" dirty="0"/>
-              <a:t>Blocks 7-8:</a:t>
-            </a:r>
-            <a:r>
-              <a:rPr lang="en-IE" dirty="0"/>
-              <a:t> Privacy and Data protection</a:t>
-            </a:r>
-          </a:p>
-          <a:p>
-            <a:r>
-              <a:rPr lang="en-IE" b="1" dirty="0"/>
-              <a:t>Block 9:</a:t>
-            </a:r>
-            <a:r>
-              <a:rPr lang="en-IE" dirty="0"/>
-              <a:t> Data breach(overcome ethical imp)</a:t>
-            </a:r>
-          </a:p>
-          <a:p>
-            <a:endParaRPr lang="en-GB" dirty="0"/>
-          </a:p>
-        </p:txBody>
-      </p:sp>
-      <p:sp>
-        <p:nvSpPr>
-          <p:cNvPr id="4" name="Text Placeholder 3"/>
-          <p:cNvSpPr>
-            <a:spLocks noGrp="1"/>
-          </p:cNvSpPr>
-          <p:nvPr>
-            <p:ph type="body" sz="quarter" idx="11"/>
-          </p:nvPr>
-        </p:nvSpPr>
-        <p:spPr/>
-        <p:txBody>
-          <a:bodyPr/>
-          <a:lstStyle/>
-          <a:p>
-            <a:r>
-              <a:rPr lang="en-GB" dirty="0"/>
-              <a:t>My Privacy Canvas </a:t>
-            </a:r>
-          </a:p>
-        </p:txBody>
-      </p:sp>
-      <p:sp>
-        <p:nvSpPr>
-          <p:cNvPr id="5" name="Slide Number Placeholder 4"/>
+              <a:t>My Privacy Canvas</a:t>
+            </a:r>
+          </a:p>
+        </p:txBody>
+      </p:sp>
+      <p:sp>
+        <p:nvSpPr>
+          <p:cNvPr id="5" name="Slide Number Placeholder 4">
+            <a:extLst>
+              <a:ext uri="{FF2B5EF4-FFF2-40B4-BE49-F238E27FC236}">
+                <a16:creationId xmlns:a16="http://schemas.microsoft.com/office/drawing/2014/main" id="{E7C39819-C0D3-42E5-9A42-779E88435EF1}"/>
+              </a:ext>
+            </a:extLst>
+          </p:cNvPr>
           <p:cNvSpPr>
             <a:spLocks noGrp="1"/>
           </p:cNvSpPr>
@@ -5905,7 +6075,7 @@
     </p:spTree>
     <p:extLst>
       <p:ext uri="{BB962C8B-B14F-4D97-AF65-F5344CB8AC3E}">
-        <p14:creationId xmlns:p14="http://schemas.microsoft.com/office/powerpoint/2010/main" val="1159338131"/>
+        <p14:creationId xmlns:p14="http://schemas.microsoft.com/office/powerpoint/2010/main" val="2759467897"/>
       </p:ext>
     </p:extLst>
   </p:cSld>
@@ -5937,7 +6107,7 @@
           <p:cNvPr id="2" name="Title 1">
             <a:extLst>
               <a:ext uri="{FF2B5EF4-FFF2-40B4-BE49-F238E27FC236}">
-                <a16:creationId xmlns:a16="http://schemas.microsoft.com/office/drawing/2014/main" id="{0A4B7CEF-1A10-4AEB-AF36-271FCF3E2668}"/>
+                <a16:creationId xmlns:a16="http://schemas.microsoft.com/office/drawing/2014/main" id="{192103C9-5037-460B-86CE-70E0C35FD65C}"/>
               </a:ext>
             </a:extLst>
           </p:cNvPr>
@@ -5965,7 +6135,7 @@
           <p:cNvPr id="3" name="Text Placeholder 2">
             <a:extLst>
               <a:ext uri="{FF2B5EF4-FFF2-40B4-BE49-F238E27FC236}">
-                <a16:creationId xmlns:a16="http://schemas.microsoft.com/office/drawing/2014/main" id="{8BF928D7-D59F-45AA-B126-C21112F51DD1}"/>
+                <a16:creationId xmlns:a16="http://schemas.microsoft.com/office/drawing/2014/main" id="{155B2DE8-C3ED-4B46-95DB-142F2DC931FD}"/>
               </a:ext>
             </a:extLst>
           </p:cNvPr>
@@ -5986,7 +6156,7 @@
             </a:pPr>
             <a:r>
               <a:rPr lang="en-IE" b="1" u="sng" dirty="0"/>
-              <a:t>1. Data Group(s)</a:t>
+              <a:t>3. Purpose and Accuracy</a:t>
             </a:r>
             <a:endParaRPr lang="en-IE" dirty="0"/>
           </a:p>
@@ -5996,35 +6166,32 @@
             </a:pPr>
             <a:r>
               <a:rPr lang="en-IE" dirty="0"/>
-              <a:t>What type of people do you hold personal data on? Employees/Customers/Adults/Children etc?</a:t>
+              <a:t>What is the purpose of keeping this data? Is the data being updated to uphold its accuracy? Is there a time limitation on the storage of the data? Is the data only being used for the initial required use?  </a:t>
             </a:r>
           </a:p>
           <a:p>
             <a:pPr marL="0" indent="0">
               <a:buNone/>
             </a:pPr>
-            <a:endParaRPr lang="en-IE" b="1" u="sng" dirty="0"/>
+            <a:r>
+              <a:rPr lang="en-IE" b="1" u="sng" dirty="0"/>
+              <a:t>4. Consent</a:t>
+            </a:r>
+            <a:endParaRPr lang="en-IE" dirty="0"/>
           </a:p>
           <a:p>
             <a:pPr marL="0" indent="0">
               <a:buNone/>
             </a:pPr>
             <a:r>
-              <a:rPr lang="en-IE" b="1" u="sng" dirty="0"/>
-              <a:t>2. Data Type</a:t>
-            </a:r>
-            <a:endParaRPr lang="en-IE" dirty="0"/>
+              <a:rPr lang="en-IE" dirty="0"/>
+              <a:t>Has consent been asked for data collection or will it be asked? Is it presented clearly? Is consent revocable?</a:t>
+            </a:r>
           </a:p>
           <a:p>
             <a:pPr marL="0" indent="0">
               <a:buNone/>
             </a:pPr>
-            <a:r>
-              <a:rPr lang="en-IE" dirty="0"/>
-              <a:t>What type of data do you hold? Children data? Sensitive data? Biometric data(data that could identify a person)?</a:t>
-            </a:r>
-          </a:p>
-          <a:p>
             <a:endParaRPr lang="en-IE" dirty="0"/>
           </a:p>
         </p:txBody>
@@ -6034,7 +6201,7 @@
           <p:cNvPr id="4" name="Text Placeholder 3">
             <a:extLst>
               <a:ext uri="{FF2B5EF4-FFF2-40B4-BE49-F238E27FC236}">
-                <a16:creationId xmlns:a16="http://schemas.microsoft.com/office/drawing/2014/main" id="{C736D03D-0E3A-4D0D-A7C7-1F42D69A0E96}"/>
+                <a16:creationId xmlns:a16="http://schemas.microsoft.com/office/drawing/2014/main" id="{524214A3-EE95-47B0-8EBF-4EF3E24023FD}"/>
               </a:ext>
             </a:extLst>
           </p:cNvPr>
@@ -6062,7 +6229,7 @@
           <p:cNvPr id="5" name="Slide Number Placeholder 4">
             <a:extLst>
               <a:ext uri="{FF2B5EF4-FFF2-40B4-BE49-F238E27FC236}">
-                <a16:creationId xmlns:a16="http://schemas.microsoft.com/office/drawing/2014/main" id="{E7C39819-C0D3-42E5-9A42-779E88435EF1}"/>
+                <a16:creationId xmlns:a16="http://schemas.microsoft.com/office/drawing/2014/main" id="{B489B72C-5FE8-4994-BF16-7DF69D19FEF1}"/>
               </a:ext>
             </a:extLst>
           </p:cNvPr>
@@ -6089,7 +6256,7 @@
     </p:spTree>
     <p:extLst>
       <p:ext uri="{BB962C8B-B14F-4D97-AF65-F5344CB8AC3E}">
-        <p14:creationId xmlns:p14="http://schemas.microsoft.com/office/powerpoint/2010/main" val="2759467897"/>
+        <p14:creationId xmlns:p14="http://schemas.microsoft.com/office/powerpoint/2010/main" val="3935469917"/>
       </p:ext>
     </p:extLst>
   </p:cSld>
@@ -6121,7 +6288,7 @@
           <p:cNvPr id="2" name="Title 1">
             <a:extLst>
               <a:ext uri="{FF2B5EF4-FFF2-40B4-BE49-F238E27FC236}">
-                <a16:creationId xmlns:a16="http://schemas.microsoft.com/office/drawing/2014/main" id="{192103C9-5037-460B-86CE-70E0C35FD65C}"/>
+                <a16:creationId xmlns:a16="http://schemas.microsoft.com/office/drawing/2014/main" id="{45745A0E-2170-42CD-B425-FB95F81C3E9E}"/>
               </a:ext>
             </a:extLst>
           </p:cNvPr>
@@ -6149,7 +6316,7 @@
           <p:cNvPr id="3" name="Text Placeholder 2">
             <a:extLst>
               <a:ext uri="{FF2B5EF4-FFF2-40B4-BE49-F238E27FC236}">
-                <a16:creationId xmlns:a16="http://schemas.microsoft.com/office/drawing/2014/main" id="{155B2DE8-C3ED-4B46-95DB-142F2DC931FD}"/>
+                <a16:creationId xmlns:a16="http://schemas.microsoft.com/office/drawing/2014/main" id="{B101F8C3-F40F-4536-9CBE-CC5C33996B28}"/>
               </a:ext>
             </a:extLst>
           </p:cNvPr>
@@ -6170,7 +6337,7 @@
             </a:pPr>
             <a:r>
               <a:rPr lang="en-IE" b="1" u="sng" dirty="0"/>
-              <a:t>3. Purpose and Accuracy</a:t>
+              <a:t>5. Transparency</a:t>
             </a:r>
             <a:endParaRPr lang="en-IE" dirty="0"/>
           </a:p>
@@ -6180,7 +6347,15 @@
             </a:pPr>
             <a:r>
               <a:rPr lang="en-IE" dirty="0"/>
-              <a:t>What is the purpose of keeping this data? Is the data being updated to uphold its accuracy? Is there a time limitation on the storage of the data? Is the data only being used for the initial required use?  </a:t>
+              <a:t>Is there transparency in the processing and use of the data? </a:t>
+            </a:r>
+            <a:r>
+              <a:rPr lang="en-IE" dirty="0" err="1"/>
+              <a:t>i.e</a:t>
+            </a:r>
+            <a:r>
+              <a:rPr lang="en-IE" dirty="0"/>
+              <a:t>: Info notices, paper trails etc</a:t>
             </a:r>
           </a:p>
           <a:p>
@@ -6189,7 +6364,7 @@
             </a:pPr>
             <a:r>
               <a:rPr lang="en-IE" b="1" u="sng" dirty="0"/>
-              <a:t>4. Consent</a:t>
+              <a:t>6. Data Rights</a:t>
             </a:r>
             <a:endParaRPr lang="en-IE" dirty="0"/>
           </a:p>
@@ -6199,7 +6374,15 @@
             </a:pPr>
             <a:r>
               <a:rPr lang="en-IE" dirty="0"/>
-              <a:t>Has consent been asked for data collection or will it be asked? Is it presented clearly? Is consent revocable?</a:t>
+              <a:t>Can data subjects access their data on request? Can the data be erased? Can data subjects object to certain types of use of the data </a:t>
+            </a:r>
+            <a:r>
+              <a:rPr lang="en-IE" dirty="0" err="1"/>
+              <a:t>eg</a:t>
+            </a:r>
+            <a:r>
+              <a:rPr lang="en-IE" dirty="0"/>
+              <a:t>: direct marketing? Will data subjects be notified on a data breach?</a:t>
             </a:r>
           </a:p>
           <a:p>
@@ -6208,6 +6391,12 @@
             </a:pPr>
             <a:endParaRPr lang="en-IE" dirty="0"/>
           </a:p>
+          <a:p>
+            <a:pPr marL="0" indent="0">
+              <a:buNone/>
+            </a:pPr>
+            <a:endParaRPr lang="en-IE" dirty="0"/>
+          </a:p>
         </p:txBody>
       </p:sp>
       <p:sp>
@@ -6215,7 +6404,7 @@
           <p:cNvPr id="4" name="Text Placeholder 3">
             <a:extLst>
               <a:ext uri="{FF2B5EF4-FFF2-40B4-BE49-F238E27FC236}">
-                <a16:creationId xmlns:a16="http://schemas.microsoft.com/office/drawing/2014/main" id="{524214A3-EE95-47B0-8EBF-4EF3E24023FD}"/>
+                <a16:creationId xmlns:a16="http://schemas.microsoft.com/office/drawing/2014/main" id="{51619E2E-036B-445B-880E-C5CA37367A42}"/>
               </a:ext>
             </a:extLst>
           </p:cNvPr>
@@ -6243,7 +6432,7 @@
           <p:cNvPr id="5" name="Slide Number Placeholder 4">
             <a:extLst>
               <a:ext uri="{FF2B5EF4-FFF2-40B4-BE49-F238E27FC236}">
-                <a16:creationId xmlns:a16="http://schemas.microsoft.com/office/drawing/2014/main" id="{B489B72C-5FE8-4994-BF16-7DF69D19FEF1}"/>
+                <a16:creationId xmlns:a16="http://schemas.microsoft.com/office/drawing/2014/main" id="{05AE0FCE-B964-42DF-A91D-5EFFC00168CD}"/>
               </a:ext>
             </a:extLst>
           </p:cNvPr>
@@ -6270,7 +6459,7 @@
     </p:spTree>
     <p:extLst>
       <p:ext uri="{BB962C8B-B14F-4D97-AF65-F5344CB8AC3E}">
-        <p14:creationId xmlns:p14="http://schemas.microsoft.com/office/powerpoint/2010/main" val="3935469917"/>
+        <p14:creationId xmlns:p14="http://schemas.microsoft.com/office/powerpoint/2010/main" val="1420828051"/>
       </p:ext>
     </p:extLst>
   </p:cSld>

</xml_diff>